<commit_message>
Merged srijals ppt with chirags
</commit_message>
<xml_diff>
--- a/Presentation/4-Aug/Robot-dev-using-ROS.pptx
+++ b/Presentation/4-Aug/Robot-dev-using-ROS.pptx
@@ -4,6 +4,9 @@
   <p:sldMasterIdLst>
     <p:sldMasterId id="2147483648" r:id="rId1"/>
   </p:sldMasterIdLst>
+  <p:notesMasterIdLst>
+    <p:notesMasterId r:id="rId15"/>
+  </p:notesMasterIdLst>
   <p:sldIdLst>
     <p:sldId id="259" r:id="rId2"/>
     <p:sldId id="260" r:id="rId3"/>
@@ -163,6 +166,570 @@
     </p:ext>
   </p:extLst>
 </p:presentation>
+</file>
+
+<file path=ppt/notesMasters/notesMaster1.xml><?xml version="1.0" encoding="utf-8"?>
+<p:notesMaster xmlns:a="http://schemas.openxmlformats.org/drawingml/2006/main" xmlns:r="http://schemas.openxmlformats.org/officeDocument/2006/relationships" xmlns:p="http://schemas.openxmlformats.org/presentationml/2006/main">
+  <p:cSld>
+    <p:bg>
+      <p:bgRef idx="1001">
+        <a:schemeClr val="bg1"/>
+      </p:bgRef>
+    </p:bg>
+    <p:spTree>
+      <p:nvGrpSpPr>
+        <p:cNvPr id="1" name=""/>
+        <p:cNvGrpSpPr/>
+        <p:nvPr/>
+      </p:nvGrpSpPr>
+      <p:grpSpPr>
+        <a:xfrm>
+          <a:off x="0" y="0"/>
+          <a:ext cx="0" cy="0"/>
+          <a:chOff x="0" y="0"/>
+          <a:chExt cx="0" cy="0"/>
+        </a:xfrm>
+      </p:grpSpPr>
+      <p:sp>
+        <p:nvSpPr>
+          <p:cNvPr id="2" name="Header Placeholder 1"/>
+          <p:cNvSpPr>
+            <a:spLocks noGrp="1"/>
+          </p:cNvSpPr>
+          <p:nvPr>
+            <p:ph type="hdr" sz="quarter"/>
+          </p:nvPr>
+        </p:nvSpPr>
+        <p:spPr>
+          <a:xfrm>
+            <a:off x="0" y="0"/>
+            <a:ext cx="2971800" cy="458788"/>
+          </a:xfrm>
+          <a:prstGeom prst="rect">
+            <a:avLst/>
+          </a:prstGeom>
+        </p:spPr>
+        <p:txBody>
+          <a:bodyPr vert="horz" lIns="91440" tIns="45720" rIns="91440" bIns="45720" rtlCol="0"/>
+          <a:lstStyle>
+            <a:lvl1pPr algn="l">
+              <a:defRPr sz="1200"/>
+            </a:lvl1pPr>
+          </a:lstStyle>
+          <a:p>
+            <a:endParaRPr lang="en-US"/>
+          </a:p>
+        </p:txBody>
+      </p:sp>
+      <p:sp>
+        <p:nvSpPr>
+          <p:cNvPr id="3" name="Date Placeholder 2"/>
+          <p:cNvSpPr>
+            <a:spLocks noGrp="1"/>
+          </p:cNvSpPr>
+          <p:nvPr>
+            <p:ph type="dt" idx="1"/>
+          </p:nvPr>
+        </p:nvSpPr>
+        <p:spPr>
+          <a:xfrm>
+            <a:off x="3884613" y="0"/>
+            <a:ext cx="2971800" cy="458788"/>
+          </a:xfrm>
+          <a:prstGeom prst="rect">
+            <a:avLst/>
+          </a:prstGeom>
+        </p:spPr>
+        <p:txBody>
+          <a:bodyPr vert="horz" lIns="91440" tIns="45720" rIns="91440" bIns="45720" rtlCol="0"/>
+          <a:lstStyle>
+            <a:lvl1pPr algn="r">
+              <a:defRPr sz="1200"/>
+            </a:lvl1pPr>
+          </a:lstStyle>
+          <a:p>
+            <a:fld id="{4B05C359-D5C9-4336-B296-64F8D1636CF5}" type="datetimeFigureOut">
+              <a:rPr lang="en-US" smtClean="0"/>
+              <a:t>03-Aug-17</a:t>
+            </a:fld>
+            <a:endParaRPr lang="en-US"/>
+          </a:p>
+        </p:txBody>
+      </p:sp>
+      <p:sp>
+        <p:nvSpPr>
+          <p:cNvPr id="4" name="Slide Image Placeholder 3"/>
+          <p:cNvSpPr>
+            <a:spLocks noGrp="1" noRot="1" noChangeAspect="1"/>
+          </p:cNvSpPr>
+          <p:nvPr>
+            <p:ph type="sldImg" idx="2"/>
+          </p:nvPr>
+        </p:nvSpPr>
+        <p:spPr>
+          <a:xfrm>
+            <a:off x="1371600" y="1143000"/>
+            <a:ext cx="4114800" cy="3086100"/>
+          </a:xfrm>
+          <a:prstGeom prst="rect">
+            <a:avLst/>
+          </a:prstGeom>
+          <a:noFill/>
+          <a:ln w="12700">
+            <a:solidFill>
+              <a:prstClr val="black"/>
+            </a:solidFill>
+          </a:ln>
+        </p:spPr>
+        <p:txBody>
+          <a:bodyPr vert="horz" lIns="91440" tIns="45720" rIns="91440" bIns="45720" rtlCol="0" anchor="ctr"/>
+          <a:lstStyle/>
+          <a:p>
+            <a:endParaRPr lang="en-US"/>
+          </a:p>
+        </p:txBody>
+      </p:sp>
+      <p:sp>
+        <p:nvSpPr>
+          <p:cNvPr id="5" name="Notes Placeholder 4"/>
+          <p:cNvSpPr>
+            <a:spLocks noGrp="1"/>
+          </p:cNvSpPr>
+          <p:nvPr>
+            <p:ph type="body" sz="quarter" idx="3"/>
+          </p:nvPr>
+        </p:nvSpPr>
+        <p:spPr>
+          <a:xfrm>
+            <a:off x="685800" y="4400550"/>
+            <a:ext cx="5486400" cy="3600450"/>
+          </a:xfrm>
+          <a:prstGeom prst="rect">
+            <a:avLst/>
+          </a:prstGeom>
+        </p:spPr>
+        <p:txBody>
+          <a:bodyPr vert="horz" lIns="91440" tIns="45720" rIns="91440" bIns="45720" rtlCol="0"/>
+          <a:lstStyle/>
+          <a:p>
+            <a:pPr lvl="0"/>
+            <a:r>
+              <a:rPr lang="en-US" smtClean="0"/>
+              <a:t>Click to edit Master text styles</a:t>
+            </a:r>
+          </a:p>
+          <a:p>
+            <a:pPr lvl="1"/>
+            <a:r>
+              <a:rPr lang="en-US" smtClean="0"/>
+              <a:t>Second level</a:t>
+            </a:r>
+          </a:p>
+          <a:p>
+            <a:pPr lvl="2"/>
+            <a:r>
+              <a:rPr lang="en-US" smtClean="0"/>
+              <a:t>Third level</a:t>
+            </a:r>
+          </a:p>
+          <a:p>
+            <a:pPr lvl="3"/>
+            <a:r>
+              <a:rPr lang="en-US" smtClean="0"/>
+              <a:t>Fourth level</a:t>
+            </a:r>
+          </a:p>
+          <a:p>
+            <a:pPr lvl="4"/>
+            <a:r>
+              <a:rPr lang="en-US" smtClean="0"/>
+              <a:t>Fifth level</a:t>
+            </a:r>
+            <a:endParaRPr lang="en-US"/>
+          </a:p>
+        </p:txBody>
+      </p:sp>
+      <p:sp>
+        <p:nvSpPr>
+          <p:cNvPr id="6" name="Footer Placeholder 5"/>
+          <p:cNvSpPr>
+            <a:spLocks noGrp="1"/>
+          </p:cNvSpPr>
+          <p:nvPr>
+            <p:ph type="ftr" sz="quarter" idx="4"/>
+          </p:nvPr>
+        </p:nvSpPr>
+        <p:spPr>
+          <a:xfrm>
+            <a:off x="0" y="8685213"/>
+            <a:ext cx="2971800" cy="458787"/>
+          </a:xfrm>
+          <a:prstGeom prst="rect">
+            <a:avLst/>
+          </a:prstGeom>
+        </p:spPr>
+        <p:txBody>
+          <a:bodyPr vert="horz" lIns="91440" tIns="45720" rIns="91440" bIns="45720" rtlCol="0" anchor="b"/>
+          <a:lstStyle>
+            <a:lvl1pPr algn="l">
+              <a:defRPr sz="1200"/>
+            </a:lvl1pPr>
+          </a:lstStyle>
+          <a:p>
+            <a:endParaRPr lang="en-US"/>
+          </a:p>
+        </p:txBody>
+      </p:sp>
+      <p:sp>
+        <p:nvSpPr>
+          <p:cNvPr id="7" name="Slide Number Placeholder 6"/>
+          <p:cNvSpPr>
+            <a:spLocks noGrp="1"/>
+          </p:cNvSpPr>
+          <p:nvPr>
+            <p:ph type="sldNum" sz="quarter" idx="5"/>
+          </p:nvPr>
+        </p:nvSpPr>
+        <p:spPr>
+          <a:xfrm>
+            <a:off x="3884613" y="8685213"/>
+            <a:ext cx="2971800" cy="458787"/>
+          </a:xfrm>
+          <a:prstGeom prst="rect">
+            <a:avLst/>
+          </a:prstGeom>
+        </p:spPr>
+        <p:txBody>
+          <a:bodyPr vert="horz" lIns="91440" tIns="45720" rIns="91440" bIns="45720" rtlCol="0" anchor="b"/>
+          <a:lstStyle>
+            <a:lvl1pPr algn="r">
+              <a:defRPr sz="1200"/>
+            </a:lvl1pPr>
+          </a:lstStyle>
+          <a:p>
+            <a:fld id="{66CF2F34-E646-4F97-994B-A301509B6013}" type="slidenum">
+              <a:rPr lang="en-US" smtClean="0"/>
+              <a:t>‹#›</a:t>
+            </a:fld>
+            <a:endParaRPr lang="en-US"/>
+          </a:p>
+        </p:txBody>
+      </p:sp>
+    </p:spTree>
+    <p:extLst>
+      <p:ext uri="{BB962C8B-B14F-4D97-AF65-F5344CB8AC3E}">
+        <p14:creationId xmlns:p14="http://schemas.microsoft.com/office/powerpoint/2010/main" val="2492308631"/>
+      </p:ext>
+    </p:extLst>
+  </p:cSld>
+  <p:clrMap bg1="lt1" tx1="dk1" bg2="lt2" tx2="dk2" accent1="accent1" accent2="accent2" accent3="accent3" accent4="accent4" accent5="accent5" accent6="accent6" hlink="hlink" folHlink="folHlink"/>
+  <p:notesStyle>
+    <a:lvl1pPr marL="0" algn="l" defTabSz="914400" rtl="0" eaLnBrk="1" latinLnBrk="0" hangingPunct="1">
+      <a:defRPr sz="1200" kern="1200">
+        <a:solidFill>
+          <a:schemeClr val="tx1"/>
+        </a:solidFill>
+        <a:latin typeface="+mn-lt"/>
+        <a:ea typeface="+mn-ea"/>
+        <a:cs typeface="+mn-cs"/>
+      </a:defRPr>
+    </a:lvl1pPr>
+    <a:lvl2pPr marL="457200" algn="l" defTabSz="914400" rtl="0" eaLnBrk="1" latinLnBrk="0" hangingPunct="1">
+      <a:defRPr sz="1200" kern="1200">
+        <a:solidFill>
+          <a:schemeClr val="tx1"/>
+        </a:solidFill>
+        <a:latin typeface="+mn-lt"/>
+        <a:ea typeface="+mn-ea"/>
+        <a:cs typeface="+mn-cs"/>
+      </a:defRPr>
+    </a:lvl2pPr>
+    <a:lvl3pPr marL="914400" algn="l" defTabSz="914400" rtl="0" eaLnBrk="1" latinLnBrk="0" hangingPunct="1">
+      <a:defRPr sz="1200" kern="1200">
+        <a:solidFill>
+          <a:schemeClr val="tx1"/>
+        </a:solidFill>
+        <a:latin typeface="+mn-lt"/>
+        <a:ea typeface="+mn-ea"/>
+        <a:cs typeface="+mn-cs"/>
+      </a:defRPr>
+    </a:lvl3pPr>
+    <a:lvl4pPr marL="1371600" algn="l" defTabSz="914400" rtl="0" eaLnBrk="1" latinLnBrk="0" hangingPunct="1">
+      <a:defRPr sz="1200" kern="1200">
+        <a:solidFill>
+          <a:schemeClr val="tx1"/>
+        </a:solidFill>
+        <a:latin typeface="+mn-lt"/>
+        <a:ea typeface="+mn-ea"/>
+        <a:cs typeface="+mn-cs"/>
+      </a:defRPr>
+    </a:lvl4pPr>
+    <a:lvl5pPr marL="1828800" algn="l" defTabSz="914400" rtl="0" eaLnBrk="1" latinLnBrk="0" hangingPunct="1">
+      <a:defRPr sz="1200" kern="1200">
+        <a:solidFill>
+          <a:schemeClr val="tx1"/>
+        </a:solidFill>
+        <a:latin typeface="+mn-lt"/>
+        <a:ea typeface="+mn-ea"/>
+        <a:cs typeface="+mn-cs"/>
+      </a:defRPr>
+    </a:lvl5pPr>
+    <a:lvl6pPr marL="2286000" algn="l" defTabSz="914400" rtl="0" eaLnBrk="1" latinLnBrk="0" hangingPunct="1">
+      <a:defRPr sz="1200" kern="1200">
+        <a:solidFill>
+          <a:schemeClr val="tx1"/>
+        </a:solidFill>
+        <a:latin typeface="+mn-lt"/>
+        <a:ea typeface="+mn-ea"/>
+        <a:cs typeface="+mn-cs"/>
+      </a:defRPr>
+    </a:lvl6pPr>
+    <a:lvl7pPr marL="2743200" algn="l" defTabSz="914400" rtl="0" eaLnBrk="1" latinLnBrk="0" hangingPunct="1">
+      <a:defRPr sz="1200" kern="1200">
+        <a:solidFill>
+          <a:schemeClr val="tx1"/>
+        </a:solidFill>
+        <a:latin typeface="+mn-lt"/>
+        <a:ea typeface="+mn-ea"/>
+        <a:cs typeface="+mn-cs"/>
+      </a:defRPr>
+    </a:lvl7pPr>
+    <a:lvl8pPr marL="3200400" algn="l" defTabSz="914400" rtl="0" eaLnBrk="1" latinLnBrk="0" hangingPunct="1">
+      <a:defRPr sz="1200" kern="1200">
+        <a:solidFill>
+          <a:schemeClr val="tx1"/>
+        </a:solidFill>
+        <a:latin typeface="+mn-lt"/>
+        <a:ea typeface="+mn-ea"/>
+        <a:cs typeface="+mn-cs"/>
+      </a:defRPr>
+    </a:lvl8pPr>
+    <a:lvl9pPr marL="3657600" algn="l" defTabSz="914400" rtl="0" eaLnBrk="1" latinLnBrk="0" hangingPunct="1">
+      <a:defRPr sz="1200" kern="1200">
+        <a:solidFill>
+          <a:schemeClr val="tx1"/>
+        </a:solidFill>
+        <a:latin typeface="+mn-lt"/>
+        <a:ea typeface="+mn-ea"/>
+        <a:cs typeface="+mn-cs"/>
+      </a:defRPr>
+    </a:lvl9pPr>
+  </p:notesStyle>
+</p:notesMaster>
+</file>
+
+<file path=ppt/notesSlides/notesSlide1.xml><?xml version="1.0" encoding="utf-8"?>
+<p:notes xmlns:a="http://schemas.openxmlformats.org/drawingml/2006/main" xmlns:r="http://schemas.openxmlformats.org/officeDocument/2006/relationships" xmlns:p="http://schemas.openxmlformats.org/presentationml/2006/main">
+  <p:cSld>
+    <p:spTree>
+      <p:nvGrpSpPr>
+        <p:cNvPr id="1" name=""/>
+        <p:cNvGrpSpPr/>
+        <p:nvPr/>
+      </p:nvGrpSpPr>
+      <p:grpSpPr>
+        <a:xfrm>
+          <a:off x="0" y="0"/>
+          <a:ext cx="0" cy="0"/>
+          <a:chOff x="0" y="0"/>
+          <a:chExt cx="0" cy="0"/>
+        </a:xfrm>
+      </p:grpSpPr>
+      <p:sp>
+        <p:nvSpPr>
+          <p:cNvPr id="2" name="Slide Image Placeholder 1"/>
+          <p:cNvSpPr>
+            <a:spLocks noGrp="1" noRot="1" noChangeAspect="1"/>
+          </p:cNvSpPr>
+          <p:nvPr>
+            <p:ph type="sldImg"/>
+          </p:nvPr>
+        </p:nvSpPr>
+        <p:spPr/>
+      </p:sp>
+      <p:sp>
+        <p:nvSpPr>
+          <p:cNvPr id="3" name="Notes Placeholder 2"/>
+          <p:cNvSpPr>
+            <a:spLocks noGrp="1"/>
+          </p:cNvSpPr>
+          <p:nvPr>
+            <p:ph type="body" idx="1"/>
+          </p:nvPr>
+        </p:nvSpPr>
+        <p:spPr/>
+        <p:txBody>
+          <a:bodyPr/>
+          <a:lstStyle/>
+          <a:p>
+            <a:r>
+              <a:rPr lang="en-US" dirty="0" smtClean="0"/>
+              <a:t>Here I will type out the notes of  </a:t>
+            </a:r>
+            <a:r>
+              <a:rPr lang="en-US" dirty="0" err="1" smtClean="0"/>
+              <a:t>whatI</a:t>
+            </a:r>
+            <a:r>
+              <a:rPr lang="en-US" dirty="0" smtClean="0"/>
+              <a:t> will be speaking</a:t>
+            </a:r>
+          </a:p>
+          <a:p>
+            <a:endParaRPr lang="en-US" dirty="0"/>
+          </a:p>
+        </p:txBody>
+      </p:sp>
+      <p:sp>
+        <p:nvSpPr>
+          <p:cNvPr id="4" name="Slide Number Placeholder 3"/>
+          <p:cNvSpPr>
+            <a:spLocks noGrp="1"/>
+          </p:cNvSpPr>
+          <p:nvPr>
+            <p:ph type="sldNum" sz="quarter" idx="10"/>
+          </p:nvPr>
+        </p:nvSpPr>
+        <p:spPr/>
+        <p:txBody>
+          <a:bodyPr/>
+          <a:lstStyle/>
+          <a:p>
+            <a:fld id="{66CF2F34-E646-4F97-994B-A301509B6013}" type="slidenum">
+              <a:rPr lang="en-US" smtClean="0"/>
+              <a:t>3</a:t>
+            </a:fld>
+            <a:endParaRPr lang="en-US"/>
+          </a:p>
+        </p:txBody>
+      </p:sp>
+    </p:spTree>
+    <p:extLst>
+      <p:ext uri="{BB962C8B-B14F-4D97-AF65-F5344CB8AC3E}">
+        <p14:creationId xmlns:p14="http://schemas.microsoft.com/office/powerpoint/2010/main" val="51555646"/>
+      </p:ext>
+    </p:extLst>
+  </p:cSld>
+  <p:clrMapOvr>
+    <a:masterClrMapping/>
+  </p:clrMapOvr>
+</p:notes>
+</file>
+
+<file path=ppt/notesSlides/notesSlide2.xml><?xml version="1.0" encoding="utf-8"?>
+<p:notes xmlns:a="http://schemas.openxmlformats.org/drawingml/2006/main" xmlns:r="http://schemas.openxmlformats.org/officeDocument/2006/relationships" xmlns:p="http://schemas.openxmlformats.org/presentationml/2006/main">
+  <p:cSld>
+    <p:spTree>
+      <p:nvGrpSpPr>
+        <p:cNvPr id="1" name=""/>
+        <p:cNvGrpSpPr/>
+        <p:nvPr/>
+      </p:nvGrpSpPr>
+      <p:grpSpPr>
+        <a:xfrm>
+          <a:off x="0" y="0"/>
+          <a:ext cx="0" cy="0"/>
+          <a:chOff x="0" y="0"/>
+          <a:chExt cx="0" cy="0"/>
+        </a:xfrm>
+      </p:grpSpPr>
+      <p:sp>
+        <p:nvSpPr>
+          <p:cNvPr id="2" name="Slide Image Placeholder 1"/>
+          <p:cNvSpPr>
+            <a:spLocks noGrp="1" noRot="1" noChangeAspect="1"/>
+          </p:cNvSpPr>
+          <p:nvPr>
+            <p:ph type="sldImg"/>
+          </p:nvPr>
+        </p:nvSpPr>
+        <p:spPr/>
+      </p:sp>
+      <p:sp>
+        <p:nvSpPr>
+          <p:cNvPr id="3" name="Notes Placeholder 2"/>
+          <p:cNvSpPr>
+            <a:spLocks noGrp="1"/>
+          </p:cNvSpPr>
+          <p:nvPr>
+            <p:ph type="body" idx="1"/>
+          </p:nvPr>
+        </p:nvSpPr>
+        <p:spPr/>
+        <p:txBody>
+          <a:bodyPr/>
+          <a:lstStyle/>
+          <a:p>
+            <a:r>
+              <a:rPr lang="en-US" dirty="0" smtClean="0"/>
+              <a:t>The Robot Operating System (ROS) is a flexible framework for developing software with tools, libraries and conventions that facilitate the creation of complex robot </a:t>
+            </a:r>
+            <a:r>
+              <a:rPr lang="en-US" dirty="0" err="1" smtClean="0"/>
+              <a:t>behaviour</a:t>
+            </a:r>
+            <a:r>
+              <a:rPr lang="en-US" dirty="0" smtClean="0"/>
+              <a:t> on a wide variety of robotic platforms</a:t>
+            </a:r>
+          </a:p>
+          <a:p>
+            <a:endParaRPr lang="en-US" dirty="0" smtClean="0"/>
+          </a:p>
+          <a:p>
+            <a:r>
+              <a:rPr lang="en-US" dirty="0" smtClean="0"/>
+              <a:t>Kinect is Microsoft's motion sensor add-on for the Xbox 360 gaming console. The device provides a natural user interface (NUI) that allows users to interact intuitively and without any intermediary device, such as a controller.</a:t>
+            </a:r>
+          </a:p>
+          <a:p>
+            <a:endParaRPr lang="en-US" dirty="0" smtClean="0"/>
+          </a:p>
+          <a:p>
+            <a:endParaRPr lang="en-US" dirty="0" smtClean="0"/>
+          </a:p>
+          <a:p>
+            <a:endParaRPr lang="en-US" dirty="0" smtClean="0"/>
+          </a:p>
+          <a:p>
+            <a:endParaRPr lang="en-US" dirty="0" smtClean="0"/>
+          </a:p>
+        </p:txBody>
+      </p:sp>
+      <p:sp>
+        <p:nvSpPr>
+          <p:cNvPr id="4" name="Slide Number Placeholder 3"/>
+          <p:cNvSpPr>
+            <a:spLocks noGrp="1"/>
+          </p:cNvSpPr>
+          <p:nvPr>
+            <p:ph type="sldNum" sz="quarter" idx="10"/>
+          </p:nvPr>
+        </p:nvSpPr>
+        <p:spPr/>
+        <p:txBody>
+          <a:bodyPr/>
+          <a:lstStyle/>
+          <a:p>
+            <a:fld id="{66CF2F34-E646-4F97-994B-A301509B6013}" type="slidenum">
+              <a:rPr lang="en-US" smtClean="0"/>
+              <a:t>5</a:t>
+            </a:fld>
+            <a:endParaRPr lang="en-US"/>
+          </a:p>
+        </p:txBody>
+      </p:sp>
+    </p:spTree>
+    <p:extLst>
+      <p:ext uri="{BB962C8B-B14F-4D97-AF65-F5344CB8AC3E}">
+        <p14:creationId xmlns:p14="http://schemas.microsoft.com/office/powerpoint/2010/main" val="2232438142"/>
+      </p:ext>
+    </p:extLst>
+  </p:cSld>
+  <p:clrMapOvr>
+    <a:masterClrMapping/>
+  </p:clrMapOvr>
+</p:notes>
 </file>
 
 <file path=ppt/slideLayouts/slideLayout1.xml><?xml version="1.0" encoding="utf-8"?>
@@ -3961,14 +4528,14 @@
             <p:ph idx="1"/>
             <p:extLst>
               <p:ext uri="{D42A27DB-BD31-4B8C-83A1-F6EECF244321}">
-                <p14:modId xmlns:p14="http://schemas.microsoft.com/office/powerpoint/2010/main" val="303352561"/>
+                <p14:modId xmlns:p14="http://schemas.microsoft.com/office/powerpoint/2010/main" val="1029601329"/>
               </p:ext>
             </p:extLst>
           </p:nvPr>
         </p:nvGraphicFramePr>
         <p:xfrm>
-          <a:off x="457200" y="1600200"/>
-          <a:ext cx="8229600" cy="2392680"/>
+          <a:off x="445477" y="2133600"/>
+          <a:ext cx="8229600" cy="3886202"/>
         </p:xfrm>
         <a:graphic>
           <a:graphicData uri="http://schemas.openxmlformats.org/drawingml/2006/table">
@@ -3980,7 +4547,7 @@
                 <a:gridCol w="1143000"/>
                 <a:gridCol w="7086600"/>
               </a:tblGrid>
-              <a:tr h="370840">
+              <a:tr h="602320">
                 <a:tc>
                   <a:txBody>
                     <a:bodyPr/>
@@ -4024,7 +4591,7 @@
                   <a:tcPr/>
                 </a:tc>
               </a:tr>
-              <a:tr h="370840">
+              <a:tr h="602320">
                 <a:tc>
                   <a:txBody>
                     <a:bodyPr/>
@@ -4068,7 +4635,7 @@
                   <a:tcPr/>
                 </a:tc>
               </a:tr>
-              <a:tr h="370840">
+              <a:tr h="602320">
                 <a:tc>
                   <a:txBody>
                     <a:bodyPr/>
@@ -4112,7 +4679,7 @@
                   <a:tcPr/>
                 </a:tc>
               </a:tr>
-              <a:tr h="370840">
+              <a:tr h="1039621">
                 <a:tc>
                   <a:txBody>
                     <a:bodyPr/>
@@ -4191,7 +4758,7 @@
                   <a:tcPr/>
                 </a:tc>
               </a:tr>
-              <a:tr h="370840">
+              <a:tr h="1039621">
                 <a:tc>
                   <a:txBody>
                     <a:bodyPr/>
@@ -4923,84 +5490,6 @@
           </a:p>
           <a:p>
             <a:pPr eaLnBrk="1" hangingPunct="1"/>
-            <a:r>
-              <a:rPr lang="en-US" dirty="0" smtClean="0"/>
-              <a:t>Use </a:t>
-            </a:r>
-            <a:r>
-              <a:rPr lang="en-US" dirty="0"/>
-              <a:t>the ROS </a:t>
-            </a:r>
-            <a:r>
-              <a:rPr lang="en-US" dirty="0" smtClean="0"/>
-              <a:t>framework and a depth camera to </a:t>
-            </a:r>
-            <a:r>
-              <a:rPr lang="en-US" dirty="0"/>
-              <a:t>create a </a:t>
-            </a:r>
-            <a:r>
-              <a:rPr lang="en-US" dirty="0" smtClean="0"/>
-              <a:t>3-dimentional map </a:t>
-            </a:r>
-            <a:r>
-              <a:rPr lang="en-US" dirty="0"/>
-              <a:t>of an indoor </a:t>
-            </a:r>
-            <a:r>
-              <a:rPr lang="en-US" dirty="0" smtClean="0"/>
-              <a:t>environment</a:t>
-            </a:r>
-          </a:p>
-          <a:p>
-            <a:pPr eaLnBrk="1" hangingPunct="1"/>
-            <a:r>
-              <a:rPr lang="en-US" dirty="0" smtClean="0"/>
-              <a:t>Make a </a:t>
-            </a:r>
-            <a:r>
-              <a:rPr lang="en-US" dirty="0" err="1"/>
-              <a:t>quadcoptor</a:t>
-            </a:r>
-            <a:r>
-              <a:rPr lang="en-US" dirty="0"/>
-              <a:t> </a:t>
-            </a:r>
-            <a:r>
-              <a:rPr lang="en-US" dirty="0" smtClean="0"/>
-              <a:t>and control it using ROS</a:t>
-            </a:r>
-          </a:p>
-          <a:p>
-            <a:pPr eaLnBrk="1" hangingPunct="1"/>
-            <a:r>
-              <a:rPr lang="en-US" dirty="0" smtClean="0"/>
-              <a:t>Create </a:t>
-            </a:r>
-            <a:r>
-              <a:rPr lang="en-US" dirty="0"/>
-              <a:t>a map of an indoor environment </a:t>
-            </a:r>
-            <a:r>
-              <a:rPr lang="en-US" dirty="0" smtClean="0"/>
-              <a:t>by mounting the depth camera </a:t>
-            </a:r>
-            <a:r>
-              <a:rPr lang="en-US" dirty="0"/>
-              <a:t>on </a:t>
-            </a:r>
-            <a:r>
-              <a:rPr lang="en-US" dirty="0" smtClean="0"/>
-              <a:t>the </a:t>
-            </a:r>
-            <a:r>
-              <a:rPr lang="en-US" dirty="0" err="1" smtClean="0"/>
-              <a:t>quadcopter</a:t>
-            </a:r>
-            <a:endParaRPr lang="en-US" dirty="0" smtClean="0"/>
-          </a:p>
-          <a:p>
-            <a:pPr eaLnBrk="1" hangingPunct="1"/>
             <a:endParaRPr lang="en-US" dirty="0"/>
           </a:p>
           <a:p>
@@ -5086,37 +5575,69 @@
           <a:bodyPr/>
           <a:lstStyle/>
           <a:p>
+            <a:pPr marL="0" indent="0">
+              <a:buNone/>
+            </a:pPr>
             <a:r>
               <a:rPr lang="en-US" dirty="0"/>
-              <a:t>This project deals with the exploring the ROS framework for development of a robotic system with </a:t>
+              <a:t>This project deals with </a:t>
+            </a:r>
+            <a:r>
+              <a:rPr lang="en-US" dirty="0" smtClean="0"/>
+              <a:t>exploring </a:t>
+            </a:r>
+            <a:r>
+              <a:rPr lang="en-US" dirty="0"/>
+              <a:t>the ROS framework for </a:t>
+            </a:r>
+            <a:endParaRPr lang="en-US" dirty="0" smtClean="0"/>
+          </a:p>
+          <a:p>
+            <a:r>
+              <a:rPr lang="en-US" dirty="0" smtClean="0"/>
+              <a:t>Development </a:t>
+            </a:r>
+            <a:r>
+              <a:rPr lang="en-US" dirty="0"/>
+              <a:t>of a robotic system with </a:t>
             </a:r>
             <a:r>
               <a:rPr lang="en-US" dirty="0" smtClean="0"/>
               <a:t>various sensors </a:t>
             </a:r>
             <a:r>
-              <a:rPr lang="en-US" dirty="0"/>
-              <a:t>and actuators in order to understand the underlying concepts and to create a </a:t>
-            </a:r>
-            <a:r>
               <a:rPr lang="en-US" dirty="0" smtClean="0"/>
-              <a:t>robot/</a:t>
+              <a:t>and actuators</a:t>
+            </a:r>
+          </a:p>
+          <a:p>
+            <a:r>
+              <a:rPr lang="en-US" dirty="0" smtClean="0"/>
+              <a:t>To develop a </a:t>
             </a:r>
             <a:r>
               <a:rPr lang="en-US" dirty="0" err="1" smtClean="0"/>
               <a:t>quadcoptor</a:t>
             </a:r>
             <a:r>
+              <a:rPr lang="en-US" dirty="0" smtClean="0"/>
+              <a:t> capable </a:t>
+            </a:r>
+            <a:r>
               <a:rPr lang="en-US" dirty="0"/>
-              <a:t> </a:t>
+              <a:t>of forming a 3D map of </a:t>
             </a:r>
             <a:r>
               <a:rPr lang="en-US" dirty="0" smtClean="0"/>
-              <a:t>capable </a:t>
+              <a:t>an indoor </a:t>
             </a:r>
             <a:r>
               <a:rPr lang="en-US" dirty="0"/>
-              <a:t>of forming a 3D map of a given environment using a depth camera (Microsoft Kinect).</a:t>
+              <a:t>environment using a depth camera (Microsoft Kinect</a:t>
+            </a:r>
+            <a:r>
+              <a:rPr lang="en-US" dirty="0" smtClean="0"/>
+              <a:t>)</a:t>
             </a:r>
             <a:endParaRPr lang="en-US" dirty="0" smtClean="0"/>
           </a:p>
@@ -5199,6 +5720,41 @@
               <a:buFont typeface="Arial" charset="0"/>
               <a:buNone/>
             </a:pPr>
+            <a:r>
+              <a:rPr lang="en-US" dirty="0" smtClean="0"/>
+              <a:t>What is ROS?</a:t>
+            </a:r>
+          </a:p>
+          <a:p>
+            <a:pPr eaLnBrk="1" hangingPunct="1">
+              <a:buNone/>
+            </a:pPr>
+            <a:r>
+              <a:rPr lang="en-US" dirty="0" smtClean="0"/>
+              <a:t>What is Microsoft Kinect?</a:t>
+            </a:r>
+          </a:p>
+          <a:p>
+            <a:pPr eaLnBrk="1" hangingPunct="1">
+              <a:buNone/>
+            </a:pPr>
+            <a:r>
+              <a:rPr lang="en-US" dirty="0" smtClean="0"/>
+              <a:t>What are the challenges?</a:t>
+            </a:r>
+          </a:p>
+          <a:p>
+            <a:pPr eaLnBrk="1" hangingPunct="1">
+              <a:buFont typeface="Arial" charset="0"/>
+              <a:buNone/>
+            </a:pPr>
+            <a:endParaRPr lang="en-US" dirty="0" smtClean="0"/>
+          </a:p>
+          <a:p>
+            <a:pPr eaLnBrk="1" hangingPunct="1">
+              <a:buFont typeface="Arial" charset="0"/>
+              <a:buNone/>
+            </a:pPr>
             <a:endParaRPr lang="en-US" dirty="0" smtClean="0"/>
           </a:p>
         </p:txBody>
@@ -5285,7 +5841,64 @@
                 <a:latin typeface="Times New Roman" pitchFamily="18" charset="0"/>
                 <a:cs typeface="Times New Roman" pitchFamily="18" charset="0"/>
               </a:rPr>
-              <a:t>If bullets are required use only the pointer shown.</a:t>
+              <a:t>Learn the ROS framework</a:t>
+            </a:r>
+          </a:p>
+          <a:p>
+            <a:pPr eaLnBrk="1" hangingPunct="1">
+              <a:buFont typeface="Wingdings" pitchFamily="2" charset="2"/>
+              <a:buChar char="Ø"/>
+            </a:pPr>
+            <a:r>
+              <a:rPr lang="en-US" dirty="0" smtClean="0">
+                <a:latin typeface="Times New Roman" pitchFamily="18" charset="0"/>
+                <a:cs typeface="Times New Roman" pitchFamily="18" charset="0"/>
+              </a:rPr>
+              <a:t>Understand and implement SLAM algorithms for 3-d mapping</a:t>
+            </a:r>
+          </a:p>
+          <a:p>
+            <a:pPr eaLnBrk="1" hangingPunct="1">
+              <a:buFont typeface="Wingdings" pitchFamily="2" charset="2"/>
+              <a:buChar char="Ø"/>
+            </a:pPr>
+            <a:r>
+              <a:rPr lang="en-US" dirty="0">
+                <a:latin typeface="Times New Roman" pitchFamily="18" charset="0"/>
+                <a:cs typeface="Times New Roman" pitchFamily="18" charset="0"/>
+              </a:rPr>
+              <a:t>Understand the interfacing of different hardware components with ROS </a:t>
+            </a:r>
+            <a:r>
+              <a:rPr lang="en-US" dirty="0" smtClean="0">
+                <a:latin typeface="Times New Roman" pitchFamily="18" charset="0"/>
+                <a:cs typeface="Times New Roman" pitchFamily="18" charset="0"/>
+              </a:rPr>
+              <a:t>packages</a:t>
+            </a:r>
+            <a:endParaRPr lang="en-US" dirty="0" smtClean="0">
+              <a:latin typeface="Times New Roman" pitchFamily="18" charset="0"/>
+              <a:cs typeface="Times New Roman" pitchFamily="18" charset="0"/>
+            </a:endParaRPr>
+          </a:p>
+          <a:p>
+            <a:pPr eaLnBrk="1" hangingPunct="1">
+              <a:buFont typeface="Wingdings" pitchFamily="2" charset="2"/>
+              <a:buChar char="Ø"/>
+            </a:pPr>
+            <a:r>
+              <a:rPr lang="en-US" dirty="0" smtClean="0">
+                <a:latin typeface="Times New Roman" pitchFamily="18" charset="0"/>
+                <a:cs typeface="Times New Roman" pitchFamily="18" charset="0"/>
+              </a:rPr>
+              <a:t>Experience </a:t>
+            </a:r>
+            <a:r>
+              <a:rPr lang="en-US" dirty="0" smtClean="0">
+                <a:latin typeface="Times New Roman" pitchFamily="18" charset="0"/>
+                <a:cs typeface="Times New Roman" pitchFamily="18" charset="0"/>
+              </a:rPr>
+              <a:t>the integration challenges of different hardware and software components</a:t>
             </a:r>
           </a:p>
         </p:txBody>
@@ -6612,4 +7225,265 @@
   <a:objectDefaults/>
   <a:extraClrSchemeLst/>
 </a:theme>
+</file>
+
+<file path=ppt/theme/theme2.xml><?xml version="1.0" encoding="utf-8"?>
+<a:theme xmlns:a="http://schemas.openxmlformats.org/drawingml/2006/main" name="Office Theme">
+  <a:themeElements>
+    <a:clrScheme name="Office">
+      <a:dk1>
+        <a:sysClr val="windowText" lastClr="000000"/>
+      </a:dk1>
+      <a:lt1>
+        <a:sysClr val="window" lastClr="FFFFFF"/>
+      </a:lt1>
+      <a:dk2>
+        <a:srgbClr val="44546A"/>
+      </a:dk2>
+      <a:lt2>
+        <a:srgbClr val="E7E6E6"/>
+      </a:lt2>
+      <a:accent1>
+        <a:srgbClr val="5B9BD5"/>
+      </a:accent1>
+      <a:accent2>
+        <a:srgbClr val="ED7D31"/>
+      </a:accent2>
+      <a:accent3>
+        <a:srgbClr val="A5A5A5"/>
+      </a:accent3>
+      <a:accent4>
+        <a:srgbClr val="FFC000"/>
+      </a:accent4>
+      <a:accent5>
+        <a:srgbClr val="4472C4"/>
+      </a:accent5>
+      <a:accent6>
+        <a:srgbClr val="70AD47"/>
+      </a:accent6>
+      <a:hlink>
+        <a:srgbClr val="0563C1"/>
+      </a:hlink>
+      <a:folHlink>
+        <a:srgbClr val="954F72"/>
+      </a:folHlink>
+    </a:clrScheme>
+    <a:fontScheme name="Office">
+      <a:majorFont>
+        <a:latin typeface="Calibri Light" panose="020F0302020204030204"/>
+        <a:ea typeface=""/>
+        <a:cs typeface=""/>
+        <a:font script="Jpan" typeface="ＭＳ Ｐゴシック"/>
+        <a:font script="Hang" typeface="맑은 고딕"/>
+        <a:font script="Hans" typeface="宋体"/>
+        <a:font script="Hant" typeface="新細明體"/>
+        <a:font script="Arab" typeface="Times New Roman"/>
+        <a:font script="Hebr" typeface="Times New Roman"/>
+        <a:font script="Thai" typeface="Angsana New"/>
+        <a:font script="Ethi" typeface="Nyala"/>
+        <a:font script="Beng" typeface="Vrinda"/>
+        <a:font script="Gujr" typeface="Shruti"/>
+        <a:font script="Khmr" typeface="MoolBoran"/>
+        <a:font script="Knda" typeface="Tunga"/>
+        <a:font script="Guru" typeface="Raavi"/>
+        <a:font script="Cans" typeface="Euphemia"/>
+        <a:font script="Cher" typeface="Plantagenet Cherokee"/>
+        <a:font script="Yiii" typeface="Microsoft Yi Baiti"/>
+        <a:font script="Tibt" typeface="Microsoft Himalaya"/>
+        <a:font script="Thaa" typeface="MV Boli"/>
+        <a:font script="Deva" typeface="Mangal"/>
+        <a:font script="Telu" typeface="Gautami"/>
+        <a:font script="Taml" typeface="Latha"/>
+        <a:font script="Syrc" typeface="Estrangelo Edessa"/>
+        <a:font script="Orya" typeface="Kalinga"/>
+        <a:font script="Mlym" typeface="Kartika"/>
+        <a:font script="Laoo" typeface="DokChampa"/>
+        <a:font script="Sinh" typeface="Iskoola Pota"/>
+        <a:font script="Mong" typeface="Mongolian Baiti"/>
+        <a:font script="Viet" typeface="Times New Roman"/>
+        <a:font script="Uigh" typeface="Microsoft Uighur"/>
+        <a:font script="Geor" typeface="Sylfaen"/>
+      </a:majorFont>
+      <a:minorFont>
+        <a:latin typeface="Calibri" panose="020F0502020204030204"/>
+        <a:ea typeface=""/>
+        <a:cs typeface=""/>
+        <a:font script="Jpan" typeface="ＭＳ Ｐゴシック"/>
+        <a:font script="Hang" typeface="맑은 고딕"/>
+        <a:font script="Hans" typeface="宋体"/>
+        <a:font script="Hant" typeface="新細明體"/>
+        <a:font script="Arab" typeface="Arial"/>
+        <a:font script="Hebr" typeface="Arial"/>
+        <a:font script="Thai" typeface="Cordia New"/>
+        <a:font script="Ethi" typeface="Nyala"/>
+        <a:font script="Beng" typeface="Vrinda"/>
+        <a:font script="Gujr" typeface="Shruti"/>
+        <a:font script="Khmr" typeface="DaunPenh"/>
+        <a:font script="Knda" typeface="Tunga"/>
+        <a:font script="Guru" typeface="Raavi"/>
+        <a:font script="Cans" typeface="Euphemia"/>
+        <a:font script="Cher" typeface="Plantagenet Cherokee"/>
+        <a:font script="Yiii" typeface="Microsoft Yi Baiti"/>
+        <a:font script="Tibt" typeface="Microsoft Himalaya"/>
+        <a:font script="Thaa" typeface="MV Boli"/>
+        <a:font script="Deva" typeface="Mangal"/>
+        <a:font script="Telu" typeface="Gautami"/>
+        <a:font script="Taml" typeface="Latha"/>
+        <a:font script="Syrc" typeface="Estrangelo Edessa"/>
+        <a:font script="Orya" typeface="Kalinga"/>
+        <a:font script="Mlym" typeface="Kartika"/>
+        <a:font script="Laoo" typeface="DokChampa"/>
+        <a:font script="Sinh" typeface="Iskoola Pota"/>
+        <a:font script="Mong" typeface="Mongolian Baiti"/>
+        <a:font script="Viet" typeface="Arial"/>
+        <a:font script="Uigh" typeface="Microsoft Uighur"/>
+        <a:font script="Geor" typeface="Sylfaen"/>
+      </a:minorFont>
+    </a:fontScheme>
+    <a:fmtScheme name="Office">
+      <a:fillStyleLst>
+        <a:solidFill>
+          <a:schemeClr val="phClr"/>
+        </a:solidFill>
+        <a:gradFill rotWithShape="1">
+          <a:gsLst>
+            <a:gs pos="0">
+              <a:schemeClr val="phClr">
+                <a:lumMod val="110000"/>
+                <a:satMod val="105000"/>
+                <a:tint val="67000"/>
+              </a:schemeClr>
+            </a:gs>
+            <a:gs pos="50000">
+              <a:schemeClr val="phClr">
+                <a:lumMod val="105000"/>
+                <a:satMod val="103000"/>
+                <a:tint val="73000"/>
+              </a:schemeClr>
+            </a:gs>
+            <a:gs pos="100000">
+              <a:schemeClr val="phClr">
+                <a:lumMod val="105000"/>
+                <a:satMod val="109000"/>
+                <a:tint val="81000"/>
+              </a:schemeClr>
+            </a:gs>
+          </a:gsLst>
+          <a:lin ang="5400000" scaled="0"/>
+        </a:gradFill>
+        <a:gradFill rotWithShape="1">
+          <a:gsLst>
+            <a:gs pos="0">
+              <a:schemeClr val="phClr">
+                <a:satMod val="103000"/>
+                <a:lumMod val="102000"/>
+                <a:tint val="94000"/>
+              </a:schemeClr>
+            </a:gs>
+            <a:gs pos="50000">
+              <a:schemeClr val="phClr">
+                <a:satMod val="110000"/>
+                <a:lumMod val="100000"/>
+                <a:shade val="100000"/>
+              </a:schemeClr>
+            </a:gs>
+            <a:gs pos="100000">
+              <a:schemeClr val="phClr">
+                <a:lumMod val="99000"/>
+                <a:satMod val="120000"/>
+                <a:shade val="78000"/>
+              </a:schemeClr>
+            </a:gs>
+          </a:gsLst>
+          <a:lin ang="5400000" scaled="0"/>
+        </a:gradFill>
+      </a:fillStyleLst>
+      <a:lnStyleLst>
+        <a:ln w="6350" cap="flat" cmpd="sng" algn="ctr">
+          <a:solidFill>
+            <a:schemeClr val="phClr"/>
+          </a:solidFill>
+          <a:prstDash val="solid"/>
+          <a:miter lim="800000"/>
+        </a:ln>
+        <a:ln w="12700" cap="flat" cmpd="sng" algn="ctr">
+          <a:solidFill>
+            <a:schemeClr val="phClr"/>
+          </a:solidFill>
+          <a:prstDash val="solid"/>
+          <a:miter lim="800000"/>
+        </a:ln>
+        <a:ln w="19050" cap="flat" cmpd="sng" algn="ctr">
+          <a:solidFill>
+            <a:schemeClr val="phClr"/>
+          </a:solidFill>
+          <a:prstDash val="solid"/>
+          <a:miter lim="800000"/>
+        </a:ln>
+      </a:lnStyleLst>
+      <a:effectStyleLst>
+        <a:effectStyle>
+          <a:effectLst/>
+        </a:effectStyle>
+        <a:effectStyle>
+          <a:effectLst/>
+        </a:effectStyle>
+        <a:effectStyle>
+          <a:effectLst>
+            <a:outerShdw blurRad="57150" dist="19050" dir="5400000" algn="ctr" rotWithShape="0">
+              <a:srgbClr val="000000">
+                <a:alpha val="63000"/>
+              </a:srgbClr>
+            </a:outerShdw>
+          </a:effectLst>
+        </a:effectStyle>
+      </a:effectStyleLst>
+      <a:bgFillStyleLst>
+        <a:solidFill>
+          <a:schemeClr val="phClr"/>
+        </a:solidFill>
+        <a:solidFill>
+          <a:schemeClr val="phClr">
+            <a:tint val="95000"/>
+            <a:satMod val="170000"/>
+          </a:schemeClr>
+        </a:solidFill>
+        <a:gradFill rotWithShape="1">
+          <a:gsLst>
+            <a:gs pos="0">
+              <a:schemeClr val="phClr">
+                <a:tint val="93000"/>
+                <a:satMod val="150000"/>
+                <a:shade val="98000"/>
+                <a:lumMod val="102000"/>
+              </a:schemeClr>
+            </a:gs>
+            <a:gs pos="50000">
+              <a:schemeClr val="phClr">
+                <a:tint val="98000"/>
+                <a:satMod val="130000"/>
+                <a:shade val="90000"/>
+                <a:lumMod val="103000"/>
+              </a:schemeClr>
+            </a:gs>
+            <a:gs pos="100000">
+              <a:schemeClr val="phClr">
+                <a:shade val="63000"/>
+                <a:satMod val="120000"/>
+              </a:schemeClr>
+            </a:gs>
+          </a:gsLst>
+          <a:lin ang="5400000" scaled="0"/>
+        </a:gradFill>
+      </a:bgFillStyleLst>
+    </a:fmtScheme>
+  </a:themeElements>
+  <a:objectDefaults/>
+  <a:extraClrSchemeLst/>
+  <a:extLst>
+    <a:ext uri="{05A4C25C-085E-4340-85A3-A5531E510DB2}">
+      <thm15:themeFamily xmlns:thm15="http://schemas.microsoft.com/office/thememl/2012/main" name="Office Theme" id="{62F939B6-93AF-4DB8-9C6B-D6C7DFDC589F}" vid="{4A3C46E8-61CC-4603-A589-7422A47A8E4A}"/>
+    </a:ext>
+  </a:extLst>
+</a:theme>
 </file>
</xml_diff>

<commit_message>
Added outline of ppt for phase 2 evaluation
</commit_message>
<xml_diff>
--- a/Presentation/4-Aug/Robot-dev-using-ROS.pptx
+++ b/Presentation/4-Aug/Robot-dev-using-ROS.pptx
@@ -7,7 +7,7 @@
     <p:sldMasterId id="2147483674" r:id="rId3"/>
   </p:sldMasterIdLst>
   <p:notesMasterIdLst>
-    <p:notesMasterId r:id="rId16"/>
+    <p:notesMasterId r:id="rId23"/>
   </p:notesMasterIdLst>
   <p:sldIdLst>
     <p:sldId id="256" r:id="rId4"/>
@@ -19,9 +19,16 @@
     <p:sldId id="262" r:id="rId10"/>
     <p:sldId id="263" r:id="rId11"/>
     <p:sldId id="264" r:id="rId12"/>
-    <p:sldId id="265" r:id="rId13"/>
-    <p:sldId id="266" r:id="rId14"/>
-    <p:sldId id="267" r:id="rId15"/>
+    <p:sldId id="268" r:id="rId13"/>
+    <p:sldId id="269" r:id="rId14"/>
+    <p:sldId id="270" r:id="rId15"/>
+    <p:sldId id="271" r:id="rId16"/>
+    <p:sldId id="272" r:id="rId17"/>
+    <p:sldId id="273" r:id="rId18"/>
+    <p:sldId id="274" r:id="rId19"/>
+    <p:sldId id="265" r:id="rId20"/>
+    <p:sldId id="266" r:id="rId21"/>
+    <p:sldId id="267" r:id="rId22"/>
   </p:sldIdLst>
   <p:sldSz cx="9144000" cy="6858000" type="screen4x3"/>
   <p:notesSz cx="6858000" cy="9144000"/>
@@ -120,6 +127,11 @@
       </a:defRPr>
     </a:lvl9pPr>
   </p:defaultTextStyle>
+  <p:extLst>
+    <p:ext uri="{EFAFB233-063F-42B5-8137-9DF3F51BA10A}">
+      <p15:sldGuideLst xmlns:p15="http://schemas.microsoft.com/office/powerpoint/2012/main"/>
+    </p:ext>
+  </p:extLst>
 </p:presentation>
 </file>
 
@@ -8175,6 +8187,1513 @@
 </file>
 
 <file path=ppt/slides/slide10.xml><?xml version="1.0" encoding="utf-8"?>
+<p:sld xmlns:a="http://schemas.openxmlformats.org/drawingml/2006/main" xmlns:r="http://schemas.openxmlformats.org/officeDocument/2006/relationships" xmlns:p="http://schemas.openxmlformats.org/presentationml/2006/main">
+  <p:cSld>
+    <p:spTree>
+      <p:nvGrpSpPr>
+        <p:cNvPr id="1" name=""/>
+        <p:cNvGrpSpPr/>
+        <p:nvPr/>
+      </p:nvGrpSpPr>
+      <p:grpSpPr>
+        <a:xfrm>
+          <a:off x="0" y="0"/>
+          <a:ext cx="0" cy="0"/>
+          <a:chOff x="0" y="0"/>
+          <a:chExt cx="0" cy="0"/>
+        </a:xfrm>
+      </p:grpSpPr>
+      <p:sp>
+        <p:nvSpPr>
+          <p:cNvPr id="140" name="TextShape 1"/>
+          <p:cNvSpPr txBox="1"/>
+          <p:nvPr/>
+        </p:nvSpPr>
+        <p:spPr>
+          <a:xfrm>
+            <a:off x="457200" y="274680"/>
+            <a:ext cx="8229240" cy="1142640"/>
+          </a:xfrm>
+          <a:prstGeom prst="rect">
+            <a:avLst/>
+          </a:prstGeom>
+          <a:noFill/>
+          <a:ln>
+            <a:noFill/>
+          </a:ln>
+        </p:spPr>
+        <p:txBody>
+          <a:bodyPr anchor="ctr"/>
+          <a:lstStyle/>
+          <a:p>
+            <a:pPr algn="ctr">
+              <a:lnSpc>
+                <a:spcPct val="100000"/>
+              </a:lnSpc>
+            </a:pPr>
+            <a:r>
+              <a:rPr lang="en-US" sz="3600" b="1" strike="noStrike" spc="-1">
+                <a:solidFill>
+                  <a:srgbClr val="000000"/>
+                </a:solidFill>
+                <a:uFill>
+                  <a:solidFill>
+                    <a:srgbClr val="FFFFFF"/>
+                  </a:solidFill>
+                </a:uFill>
+                <a:latin typeface="Times New Roman"/>
+              </a:rPr>
+              <a:t>Results</a:t>
+            </a:r>
+            <a:endParaRPr lang="en-US" sz="4400" b="0" strike="noStrike" spc="-1">
+              <a:solidFill>
+                <a:srgbClr val="000000"/>
+              </a:solidFill>
+              <a:uFill>
+                <a:solidFill>
+                  <a:srgbClr val="FFFFFF"/>
+                </a:solidFill>
+              </a:uFill>
+              <a:latin typeface="Calibri"/>
+            </a:endParaRPr>
+          </a:p>
+        </p:txBody>
+      </p:sp>
+      <p:sp>
+        <p:nvSpPr>
+          <p:cNvPr id="141" name="TextShape 2"/>
+          <p:cNvSpPr txBox="1"/>
+          <p:nvPr/>
+        </p:nvSpPr>
+        <p:spPr>
+          <a:xfrm>
+            <a:off x="576360" y="1152360"/>
+            <a:ext cx="8229240" cy="1783800"/>
+          </a:xfrm>
+          <a:prstGeom prst="rect">
+            <a:avLst/>
+          </a:prstGeom>
+          <a:noFill/>
+          <a:ln>
+            <a:noFill/>
+          </a:ln>
+        </p:spPr>
+        <p:txBody>
+          <a:bodyPr/>
+          <a:lstStyle/>
+          <a:p>
+            <a:pPr marL="108000">
+              <a:buClr>
+                <a:srgbClr val="000000"/>
+              </a:buClr>
+              <a:buSzPct val="45000"/>
+            </a:pPr>
+            <a:r>
+              <a:rPr lang="en-US" sz="3200" b="0" strike="noStrike" spc="-1" dirty="0" smtClean="0">
+                <a:solidFill>
+                  <a:srgbClr val="000000"/>
+                </a:solidFill>
+                <a:uFill>
+                  <a:solidFill>
+                    <a:srgbClr val="FFFFFF"/>
+                  </a:solidFill>
+                </a:uFill>
+                <a:latin typeface="Calibri"/>
+              </a:rPr>
+              <a:t>SS of mapping o/p</a:t>
+            </a:r>
+            <a:endParaRPr lang="en-US" sz="3200" b="0" strike="noStrike" spc="-1" dirty="0">
+              <a:solidFill>
+                <a:srgbClr val="000000"/>
+              </a:solidFill>
+              <a:uFill>
+                <a:solidFill>
+                  <a:srgbClr val="FFFFFF"/>
+                </a:solidFill>
+              </a:uFill>
+              <a:latin typeface="Calibri"/>
+            </a:endParaRPr>
+          </a:p>
+        </p:txBody>
+      </p:sp>
+    </p:spTree>
+    <p:extLst>
+      <p:ext uri="{BB962C8B-B14F-4D97-AF65-F5344CB8AC3E}">
+        <p14:creationId xmlns:p14="http://schemas.microsoft.com/office/powerpoint/2010/main" val="3064358095"/>
+      </p:ext>
+    </p:extLst>
+  </p:cSld>
+  <p:clrMapOvr>
+    <a:masterClrMapping/>
+  </p:clrMapOvr>
+  <p:timing>
+    <p:tnLst>
+      <p:par>
+        <p:cTn id="1" dur="indefinite" restart="never" nodeType="tmRoot">
+          <p:childTnLst>
+            <p:seq>
+              <p:cTn id="2" nodeType="mainSeq"/>
+              <p:prevCondLst>
+                <p:cond evt="onPrev" delay="0">
+                  <p:tgtEl>
+                    <p:sldTgt/>
+                  </p:tgtEl>
+                </p:cond>
+              </p:prevCondLst>
+              <p:nextCondLst>
+                <p:cond evt="onNext" delay="0">
+                  <p:tgtEl>
+                    <p:sldTgt/>
+                  </p:tgtEl>
+                </p:cond>
+              </p:nextCondLst>
+            </p:seq>
+          </p:childTnLst>
+        </p:cTn>
+      </p:par>
+    </p:tnLst>
+  </p:timing>
+</p:sld>
+</file>
+
+<file path=ppt/slides/slide11.xml><?xml version="1.0" encoding="utf-8"?>
+<p:sld xmlns:a="http://schemas.openxmlformats.org/drawingml/2006/main" xmlns:r="http://schemas.openxmlformats.org/officeDocument/2006/relationships" xmlns:p="http://schemas.openxmlformats.org/presentationml/2006/main">
+  <p:cSld>
+    <p:spTree>
+      <p:nvGrpSpPr>
+        <p:cNvPr id="1" name=""/>
+        <p:cNvGrpSpPr/>
+        <p:nvPr/>
+      </p:nvGrpSpPr>
+      <p:grpSpPr>
+        <a:xfrm>
+          <a:off x="0" y="0"/>
+          <a:ext cx="0" cy="0"/>
+          <a:chOff x="0" y="0"/>
+          <a:chExt cx="0" cy="0"/>
+        </a:xfrm>
+      </p:grpSpPr>
+      <p:sp>
+        <p:nvSpPr>
+          <p:cNvPr id="140" name="TextShape 1"/>
+          <p:cNvSpPr txBox="1"/>
+          <p:nvPr/>
+        </p:nvSpPr>
+        <p:spPr>
+          <a:xfrm>
+            <a:off x="457200" y="274680"/>
+            <a:ext cx="8229240" cy="1142640"/>
+          </a:xfrm>
+          <a:prstGeom prst="rect">
+            <a:avLst/>
+          </a:prstGeom>
+          <a:noFill/>
+          <a:ln>
+            <a:noFill/>
+          </a:ln>
+        </p:spPr>
+        <p:txBody>
+          <a:bodyPr anchor="ctr"/>
+          <a:lstStyle/>
+          <a:p>
+            <a:pPr algn="ctr">
+              <a:lnSpc>
+                <a:spcPct val="100000"/>
+              </a:lnSpc>
+            </a:pPr>
+            <a:r>
+              <a:rPr lang="en-US" sz="3600" b="1" strike="noStrike" spc="-1">
+                <a:solidFill>
+                  <a:srgbClr val="000000"/>
+                </a:solidFill>
+                <a:uFill>
+                  <a:solidFill>
+                    <a:srgbClr val="FFFFFF"/>
+                  </a:solidFill>
+                </a:uFill>
+                <a:latin typeface="Times New Roman"/>
+              </a:rPr>
+              <a:t>Results</a:t>
+            </a:r>
+            <a:endParaRPr lang="en-US" sz="4400" b="0" strike="noStrike" spc="-1">
+              <a:solidFill>
+                <a:srgbClr val="000000"/>
+              </a:solidFill>
+              <a:uFill>
+                <a:solidFill>
+                  <a:srgbClr val="FFFFFF"/>
+                </a:solidFill>
+              </a:uFill>
+              <a:latin typeface="Calibri"/>
+            </a:endParaRPr>
+          </a:p>
+        </p:txBody>
+      </p:sp>
+      <p:sp>
+        <p:nvSpPr>
+          <p:cNvPr id="141" name="TextShape 2"/>
+          <p:cNvSpPr txBox="1"/>
+          <p:nvPr/>
+        </p:nvSpPr>
+        <p:spPr>
+          <a:xfrm>
+            <a:off x="576360" y="1152360"/>
+            <a:ext cx="8229240" cy="1783800"/>
+          </a:xfrm>
+          <a:prstGeom prst="rect">
+            <a:avLst/>
+          </a:prstGeom>
+          <a:noFill/>
+          <a:ln>
+            <a:noFill/>
+          </a:ln>
+        </p:spPr>
+        <p:txBody>
+          <a:bodyPr/>
+          <a:lstStyle/>
+          <a:p>
+            <a:pPr marL="108000">
+              <a:buClr>
+                <a:srgbClr val="000000"/>
+              </a:buClr>
+              <a:buSzPct val="45000"/>
+            </a:pPr>
+            <a:r>
+              <a:rPr lang="en-US" sz="3200" spc="-1" dirty="0">
+                <a:solidFill>
+                  <a:srgbClr val="000000"/>
+                </a:solidFill>
+                <a:uFill>
+                  <a:solidFill>
+                    <a:srgbClr val="FFFFFF"/>
+                  </a:solidFill>
+                </a:uFill>
+                <a:latin typeface="Calibri"/>
+              </a:rPr>
+              <a:t>Potential problems with </a:t>
+            </a:r>
+            <a:r>
+              <a:rPr lang="en-US" sz="3200" spc="-1" dirty="0" err="1" smtClean="0">
+                <a:solidFill>
+                  <a:srgbClr val="000000"/>
+                </a:solidFill>
+                <a:uFill>
+                  <a:solidFill>
+                    <a:srgbClr val="FFFFFF"/>
+                  </a:solidFill>
+                </a:uFill>
+                <a:latin typeface="Calibri"/>
+              </a:rPr>
+              <a:t>rpi</a:t>
+            </a:r>
+            <a:r>
+              <a:rPr lang="en-US" sz="3200" spc="-1" dirty="0" smtClean="0">
+                <a:solidFill>
+                  <a:srgbClr val="000000"/>
+                </a:solidFill>
+                <a:uFill>
+                  <a:solidFill>
+                    <a:srgbClr val="FFFFFF"/>
+                  </a:solidFill>
+                </a:uFill>
+                <a:latin typeface="Calibri"/>
+              </a:rPr>
+              <a:t> </a:t>
+            </a:r>
+            <a:r>
+              <a:rPr lang="en-US" sz="3200" b="0" strike="noStrike" spc="-1" dirty="0" smtClean="0">
+                <a:solidFill>
+                  <a:srgbClr val="000000"/>
+                </a:solidFill>
+                <a:uFill>
+                  <a:solidFill>
+                    <a:srgbClr val="FFFFFF"/>
+                  </a:solidFill>
+                </a:uFill>
+                <a:latin typeface="Calibri"/>
+              </a:rPr>
+              <a:t>and solutions</a:t>
+            </a:r>
+          </a:p>
+          <a:p>
+            <a:pPr marL="108000">
+              <a:buClr>
+                <a:srgbClr val="000000"/>
+              </a:buClr>
+              <a:buSzPct val="45000"/>
+            </a:pPr>
+            <a:r>
+              <a:rPr lang="en-US" sz="3200" spc="-1" dirty="0" smtClean="0">
+                <a:solidFill>
+                  <a:srgbClr val="000000"/>
+                </a:solidFill>
+                <a:uFill>
+                  <a:solidFill>
+                    <a:srgbClr val="FFFFFF"/>
+                  </a:solidFill>
+                </a:uFill>
+                <a:latin typeface="Calibri"/>
+              </a:rPr>
+              <a:t>Paste pictures</a:t>
+            </a:r>
+            <a:endParaRPr lang="en-US" sz="3200" b="0" strike="noStrike" spc="-1" dirty="0">
+              <a:solidFill>
+                <a:srgbClr val="000000"/>
+              </a:solidFill>
+              <a:uFill>
+                <a:solidFill>
+                  <a:srgbClr val="FFFFFF"/>
+                </a:solidFill>
+              </a:uFill>
+              <a:latin typeface="Calibri"/>
+            </a:endParaRPr>
+          </a:p>
+        </p:txBody>
+      </p:sp>
+    </p:spTree>
+    <p:extLst>
+      <p:ext uri="{BB962C8B-B14F-4D97-AF65-F5344CB8AC3E}">
+        <p14:creationId xmlns:p14="http://schemas.microsoft.com/office/powerpoint/2010/main" val="643032549"/>
+      </p:ext>
+    </p:extLst>
+  </p:cSld>
+  <p:clrMapOvr>
+    <a:masterClrMapping/>
+  </p:clrMapOvr>
+  <p:timing>
+    <p:tnLst>
+      <p:par>
+        <p:cTn id="1" dur="indefinite" restart="never" nodeType="tmRoot">
+          <p:childTnLst>
+            <p:seq>
+              <p:cTn id="2" nodeType="mainSeq"/>
+              <p:prevCondLst>
+                <p:cond evt="onPrev" delay="0">
+                  <p:tgtEl>
+                    <p:sldTgt/>
+                  </p:tgtEl>
+                </p:cond>
+              </p:prevCondLst>
+              <p:nextCondLst>
+                <p:cond evt="onNext" delay="0">
+                  <p:tgtEl>
+                    <p:sldTgt/>
+                  </p:tgtEl>
+                </p:cond>
+              </p:nextCondLst>
+            </p:seq>
+          </p:childTnLst>
+        </p:cTn>
+      </p:par>
+    </p:tnLst>
+  </p:timing>
+</p:sld>
+</file>
+
+<file path=ppt/slides/slide12.xml><?xml version="1.0" encoding="utf-8"?>
+<p:sld xmlns:a="http://schemas.openxmlformats.org/drawingml/2006/main" xmlns:r="http://schemas.openxmlformats.org/officeDocument/2006/relationships" xmlns:p="http://schemas.openxmlformats.org/presentationml/2006/main">
+  <p:cSld>
+    <p:spTree>
+      <p:nvGrpSpPr>
+        <p:cNvPr id="1" name=""/>
+        <p:cNvGrpSpPr/>
+        <p:nvPr/>
+      </p:nvGrpSpPr>
+      <p:grpSpPr>
+        <a:xfrm>
+          <a:off x="0" y="0"/>
+          <a:ext cx="0" cy="0"/>
+          <a:chOff x="0" y="0"/>
+          <a:chExt cx="0" cy="0"/>
+        </a:xfrm>
+      </p:grpSpPr>
+      <p:sp>
+        <p:nvSpPr>
+          <p:cNvPr id="140" name="TextShape 1"/>
+          <p:cNvSpPr txBox="1"/>
+          <p:nvPr/>
+        </p:nvSpPr>
+        <p:spPr>
+          <a:xfrm>
+            <a:off x="457200" y="274680"/>
+            <a:ext cx="8229240" cy="1142640"/>
+          </a:xfrm>
+          <a:prstGeom prst="rect">
+            <a:avLst/>
+          </a:prstGeom>
+          <a:noFill/>
+          <a:ln>
+            <a:noFill/>
+          </a:ln>
+        </p:spPr>
+        <p:txBody>
+          <a:bodyPr anchor="ctr"/>
+          <a:lstStyle/>
+          <a:p>
+            <a:pPr algn="ctr">
+              <a:lnSpc>
+                <a:spcPct val="100000"/>
+              </a:lnSpc>
+            </a:pPr>
+            <a:r>
+              <a:rPr lang="en-US" sz="3600" b="1" strike="noStrike" spc="-1">
+                <a:solidFill>
+                  <a:srgbClr val="000000"/>
+                </a:solidFill>
+                <a:uFill>
+                  <a:solidFill>
+                    <a:srgbClr val="FFFFFF"/>
+                  </a:solidFill>
+                </a:uFill>
+                <a:latin typeface="Times New Roman"/>
+              </a:rPr>
+              <a:t>Results</a:t>
+            </a:r>
+            <a:endParaRPr lang="en-US" sz="4400" b="0" strike="noStrike" spc="-1">
+              <a:solidFill>
+                <a:srgbClr val="000000"/>
+              </a:solidFill>
+              <a:uFill>
+                <a:solidFill>
+                  <a:srgbClr val="FFFFFF"/>
+                </a:solidFill>
+              </a:uFill>
+              <a:latin typeface="Calibri"/>
+            </a:endParaRPr>
+          </a:p>
+        </p:txBody>
+      </p:sp>
+      <p:sp>
+        <p:nvSpPr>
+          <p:cNvPr id="141" name="TextShape 2"/>
+          <p:cNvSpPr txBox="1"/>
+          <p:nvPr/>
+        </p:nvSpPr>
+        <p:spPr>
+          <a:xfrm>
+            <a:off x="576360" y="1152360"/>
+            <a:ext cx="8229240" cy="1783800"/>
+          </a:xfrm>
+          <a:prstGeom prst="rect">
+            <a:avLst/>
+          </a:prstGeom>
+          <a:noFill/>
+          <a:ln>
+            <a:noFill/>
+          </a:ln>
+        </p:spPr>
+        <p:txBody>
+          <a:bodyPr/>
+          <a:lstStyle/>
+          <a:p>
+            <a:pPr marL="108000">
+              <a:buClr>
+                <a:srgbClr val="000000"/>
+              </a:buClr>
+              <a:buSzPct val="45000"/>
+            </a:pPr>
+            <a:r>
+              <a:rPr lang="en-US" sz="3200" b="0" strike="noStrike" spc="-1" dirty="0" smtClean="0">
+                <a:solidFill>
+                  <a:srgbClr val="000000"/>
+                </a:solidFill>
+                <a:uFill>
+                  <a:solidFill>
+                    <a:srgbClr val="FFFFFF"/>
+                  </a:solidFill>
+                </a:uFill>
+                <a:latin typeface="Calibri"/>
+              </a:rPr>
+              <a:t>Drone design and build plan</a:t>
+            </a:r>
+            <a:endParaRPr lang="en-US" sz="3200" b="0" strike="noStrike" spc="-1" dirty="0">
+              <a:solidFill>
+                <a:srgbClr val="000000"/>
+              </a:solidFill>
+              <a:uFill>
+                <a:solidFill>
+                  <a:srgbClr val="FFFFFF"/>
+                </a:solidFill>
+              </a:uFill>
+              <a:latin typeface="Calibri"/>
+            </a:endParaRPr>
+          </a:p>
+        </p:txBody>
+      </p:sp>
+    </p:spTree>
+    <p:extLst>
+      <p:ext uri="{BB962C8B-B14F-4D97-AF65-F5344CB8AC3E}">
+        <p14:creationId xmlns:p14="http://schemas.microsoft.com/office/powerpoint/2010/main" val="3805704562"/>
+      </p:ext>
+    </p:extLst>
+  </p:cSld>
+  <p:clrMapOvr>
+    <a:masterClrMapping/>
+  </p:clrMapOvr>
+  <p:timing>
+    <p:tnLst>
+      <p:par>
+        <p:cTn id="1" dur="indefinite" restart="never" nodeType="tmRoot">
+          <p:childTnLst>
+            <p:seq>
+              <p:cTn id="2" nodeType="mainSeq"/>
+              <p:prevCondLst>
+                <p:cond evt="onPrev" delay="0">
+                  <p:tgtEl>
+                    <p:sldTgt/>
+                  </p:tgtEl>
+                </p:cond>
+              </p:prevCondLst>
+              <p:nextCondLst>
+                <p:cond evt="onNext" delay="0">
+                  <p:tgtEl>
+                    <p:sldTgt/>
+                  </p:tgtEl>
+                </p:cond>
+              </p:nextCondLst>
+            </p:seq>
+          </p:childTnLst>
+        </p:cTn>
+      </p:par>
+    </p:tnLst>
+  </p:timing>
+</p:sld>
+</file>
+
+<file path=ppt/slides/slide13.xml><?xml version="1.0" encoding="utf-8"?>
+<p:sld xmlns:a="http://schemas.openxmlformats.org/drawingml/2006/main" xmlns:r="http://schemas.openxmlformats.org/officeDocument/2006/relationships" xmlns:p="http://schemas.openxmlformats.org/presentationml/2006/main">
+  <p:cSld>
+    <p:spTree>
+      <p:nvGrpSpPr>
+        <p:cNvPr id="1" name=""/>
+        <p:cNvGrpSpPr/>
+        <p:nvPr/>
+      </p:nvGrpSpPr>
+      <p:grpSpPr>
+        <a:xfrm>
+          <a:off x="0" y="0"/>
+          <a:ext cx="0" cy="0"/>
+          <a:chOff x="0" y="0"/>
+          <a:chExt cx="0" cy="0"/>
+        </a:xfrm>
+      </p:grpSpPr>
+      <p:sp>
+        <p:nvSpPr>
+          <p:cNvPr id="140" name="TextShape 1"/>
+          <p:cNvSpPr txBox="1"/>
+          <p:nvPr/>
+        </p:nvSpPr>
+        <p:spPr>
+          <a:xfrm>
+            <a:off x="457200" y="274680"/>
+            <a:ext cx="8229240" cy="1142640"/>
+          </a:xfrm>
+          <a:prstGeom prst="rect">
+            <a:avLst/>
+          </a:prstGeom>
+          <a:noFill/>
+          <a:ln>
+            <a:noFill/>
+          </a:ln>
+        </p:spPr>
+        <p:txBody>
+          <a:bodyPr anchor="ctr"/>
+          <a:lstStyle/>
+          <a:p>
+            <a:pPr algn="ctr">
+              <a:lnSpc>
+                <a:spcPct val="100000"/>
+              </a:lnSpc>
+            </a:pPr>
+            <a:r>
+              <a:rPr lang="en-US" sz="4400" b="0" strike="noStrike" spc="-1" dirty="0" smtClean="0">
+                <a:solidFill>
+                  <a:srgbClr val="000000"/>
+                </a:solidFill>
+                <a:uFill>
+                  <a:solidFill>
+                    <a:srgbClr val="FFFFFF"/>
+                  </a:solidFill>
+                </a:uFill>
+                <a:latin typeface="Calibri"/>
+              </a:rPr>
+              <a:t>Challenges Faced</a:t>
+            </a:r>
+            <a:endParaRPr lang="en-US" sz="4400" b="0" strike="noStrike" spc="-1" dirty="0">
+              <a:solidFill>
+                <a:srgbClr val="000000"/>
+              </a:solidFill>
+              <a:uFill>
+                <a:solidFill>
+                  <a:srgbClr val="FFFFFF"/>
+                </a:solidFill>
+              </a:uFill>
+              <a:latin typeface="Calibri"/>
+            </a:endParaRPr>
+          </a:p>
+        </p:txBody>
+      </p:sp>
+      <p:sp>
+        <p:nvSpPr>
+          <p:cNvPr id="141" name="TextShape 2"/>
+          <p:cNvSpPr txBox="1"/>
+          <p:nvPr/>
+        </p:nvSpPr>
+        <p:spPr>
+          <a:xfrm>
+            <a:off x="576360" y="1152360"/>
+            <a:ext cx="8229240" cy="1783800"/>
+          </a:xfrm>
+          <a:prstGeom prst="rect">
+            <a:avLst/>
+          </a:prstGeom>
+          <a:noFill/>
+          <a:ln>
+            <a:noFill/>
+          </a:ln>
+        </p:spPr>
+        <p:txBody>
+          <a:bodyPr/>
+          <a:lstStyle/>
+          <a:p>
+            <a:pPr marL="108000">
+              <a:buClr>
+                <a:srgbClr val="000000"/>
+              </a:buClr>
+              <a:buSzPct val="45000"/>
+            </a:pPr>
+            <a:r>
+              <a:rPr lang="en-US" sz="3200" b="0" strike="noStrike" spc="-1" dirty="0" smtClean="0">
+                <a:solidFill>
+                  <a:srgbClr val="000000"/>
+                </a:solidFill>
+                <a:uFill>
+                  <a:solidFill>
+                    <a:srgbClr val="FFFFFF"/>
+                  </a:solidFill>
+                </a:uFill>
+                <a:latin typeface="Calibri"/>
+              </a:rPr>
+              <a:t>Installation, lack of resources, debugging difficulty etc.</a:t>
+            </a:r>
+            <a:endParaRPr lang="en-US" sz="3200" b="0" strike="noStrike" spc="-1" dirty="0">
+              <a:solidFill>
+                <a:srgbClr val="000000"/>
+              </a:solidFill>
+              <a:uFill>
+                <a:solidFill>
+                  <a:srgbClr val="FFFFFF"/>
+                </a:solidFill>
+              </a:uFill>
+              <a:latin typeface="Calibri"/>
+            </a:endParaRPr>
+          </a:p>
+        </p:txBody>
+      </p:sp>
+    </p:spTree>
+    <p:extLst>
+      <p:ext uri="{BB962C8B-B14F-4D97-AF65-F5344CB8AC3E}">
+        <p14:creationId xmlns:p14="http://schemas.microsoft.com/office/powerpoint/2010/main" val="1716158590"/>
+      </p:ext>
+    </p:extLst>
+  </p:cSld>
+  <p:clrMapOvr>
+    <a:masterClrMapping/>
+  </p:clrMapOvr>
+  <p:timing>
+    <p:tnLst>
+      <p:par>
+        <p:cTn id="1" dur="indefinite" restart="never" nodeType="tmRoot">
+          <p:childTnLst>
+            <p:seq>
+              <p:cTn id="2" nodeType="mainSeq"/>
+              <p:prevCondLst>
+                <p:cond evt="onPrev" delay="0">
+                  <p:tgtEl>
+                    <p:sldTgt/>
+                  </p:tgtEl>
+                </p:cond>
+              </p:prevCondLst>
+              <p:nextCondLst>
+                <p:cond evt="onNext" delay="0">
+                  <p:tgtEl>
+                    <p:sldTgt/>
+                  </p:tgtEl>
+                </p:cond>
+              </p:nextCondLst>
+            </p:seq>
+          </p:childTnLst>
+        </p:cTn>
+      </p:par>
+    </p:tnLst>
+  </p:timing>
+</p:sld>
+</file>
+
+<file path=ppt/slides/slide14.xml><?xml version="1.0" encoding="utf-8"?>
+<p:sld xmlns:a="http://schemas.openxmlformats.org/drawingml/2006/main" xmlns:r="http://schemas.openxmlformats.org/officeDocument/2006/relationships" xmlns:p="http://schemas.openxmlformats.org/presentationml/2006/main">
+  <p:cSld>
+    <p:spTree>
+      <p:nvGrpSpPr>
+        <p:cNvPr id="1" name=""/>
+        <p:cNvGrpSpPr/>
+        <p:nvPr/>
+      </p:nvGrpSpPr>
+      <p:grpSpPr>
+        <a:xfrm>
+          <a:off x="0" y="0"/>
+          <a:ext cx="0" cy="0"/>
+          <a:chOff x="0" y="0"/>
+          <a:chExt cx="0" cy="0"/>
+        </a:xfrm>
+      </p:grpSpPr>
+      <p:sp>
+        <p:nvSpPr>
+          <p:cNvPr id="140" name="TextShape 1"/>
+          <p:cNvSpPr txBox="1"/>
+          <p:nvPr/>
+        </p:nvSpPr>
+        <p:spPr>
+          <a:xfrm>
+            <a:off x="457200" y="274680"/>
+            <a:ext cx="8229240" cy="1142640"/>
+          </a:xfrm>
+          <a:prstGeom prst="rect">
+            <a:avLst/>
+          </a:prstGeom>
+          <a:noFill/>
+          <a:ln>
+            <a:noFill/>
+          </a:ln>
+        </p:spPr>
+        <p:txBody>
+          <a:bodyPr anchor="ctr"/>
+          <a:lstStyle/>
+          <a:p>
+            <a:pPr algn="ctr">
+              <a:lnSpc>
+                <a:spcPct val="100000"/>
+              </a:lnSpc>
+            </a:pPr>
+            <a:r>
+              <a:rPr lang="en-US" sz="4400" spc="-1" dirty="0" smtClean="0">
+                <a:solidFill>
+                  <a:srgbClr val="000000"/>
+                </a:solidFill>
+                <a:uFill>
+                  <a:solidFill>
+                    <a:srgbClr val="FFFFFF"/>
+                  </a:solidFill>
+                </a:uFill>
+                <a:latin typeface="Calibri"/>
+              </a:rPr>
+              <a:t>Foreseeable </a:t>
+            </a:r>
+            <a:r>
+              <a:rPr lang="en-US" sz="4400" b="0" strike="noStrike" spc="-1" dirty="0" smtClean="0">
+                <a:solidFill>
+                  <a:srgbClr val="000000"/>
+                </a:solidFill>
+                <a:uFill>
+                  <a:solidFill>
+                    <a:srgbClr val="FFFFFF"/>
+                  </a:solidFill>
+                </a:uFill>
+                <a:latin typeface="Calibri"/>
+              </a:rPr>
+              <a:t>Challenges</a:t>
+            </a:r>
+            <a:endParaRPr lang="en-US" sz="4400" b="0" strike="noStrike" spc="-1" dirty="0">
+              <a:solidFill>
+                <a:srgbClr val="000000"/>
+              </a:solidFill>
+              <a:uFill>
+                <a:solidFill>
+                  <a:srgbClr val="FFFFFF"/>
+                </a:solidFill>
+              </a:uFill>
+              <a:latin typeface="Calibri"/>
+            </a:endParaRPr>
+          </a:p>
+        </p:txBody>
+      </p:sp>
+      <p:sp>
+        <p:nvSpPr>
+          <p:cNvPr id="141" name="TextShape 2"/>
+          <p:cNvSpPr txBox="1"/>
+          <p:nvPr/>
+        </p:nvSpPr>
+        <p:spPr>
+          <a:xfrm>
+            <a:off x="457200" y="1417320"/>
+            <a:ext cx="8229240" cy="3154680"/>
+          </a:xfrm>
+          <a:prstGeom prst="rect">
+            <a:avLst/>
+          </a:prstGeom>
+          <a:noFill/>
+          <a:ln>
+            <a:noFill/>
+          </a:ln>
+        </p:spPr>
+        <p:txBody>
+          <a:bodyPr/>
+          <a:lstStyle/>
+          <a:p>
+            <a:pPr marL="108000">
+              <a:buClr>
+                <a:srgbClr val="000000"/>
+              </a:buClr>
+              <a:buSzPct val="45000"/>
+            </a:pPr>
+            <a:r>
+              <a:rPr lang="en-US" sz="3200" b="0" strike="noStrike" spc="-1" dirty="0" smtClean="0">
+                <a:solidFill>
+                  <a:srgbClr val="000000"/>
+                </a:solidFill>
+                <a:uFill>
+                  <a:solidFill>
+                    <a:srgbClr val="FFFFFF"/>
+                  </a:solidFill>
+                </a:uFill>
+                <a:latin typeface="Calibri"/>
+              </a:rPr>
+              <a:t>With mapping using SBC</a:t>
+            </a:r>
+          </a:p>
+          <a:p>
+            <a:pPr marL="108000">
+              <a:buClr>
+                <a:srgbClr val="000000"/>
+              </a:buClr>
+              <a:buSzPct val="45000"/>
+            </a:pPr>
+            <a:r>
+              <a:rPr lang="en-US" sz="3200" spc="-1" dirty="0" smtClean="0">
+                <a:solidFill>
+                  <a:srgbClr val="000000"/>
+                </a:solidFill>
+                <a:uFill>
+                  <a:solidFill>
+                    <a:srgbClr val="FFFFFF"/>
+                  </a:solidFill>
+                </a:uFill>
+                <a:latin typeface="Calibri"/>
+              </a:rPr>
+              <a:t>Drone building</a:t>
+            </a:r>
+          </a:p>
+          <a:p>
+            <a:pPr marL="108000">
+              <a:buClr>
+                <a:srgbClr val="000000"/>
+              </a:buClr>
+              <a:buSzPct val="45000"/>
+            </a:pPr>
+            <a:r>
+              <a:rPr lang="en-US" sz="3200" b="0" strike="noStrike" spc="-1" dirty="0" smtClean="0">
+                <a:solidFill>
+                  <a:srgbClr val="000000"/>
+                </a:solidFill>
+                <a:uFill>
+                  <a:solidFill>
+                    <a:srgbClr val="FFFFFF"/>
+                  </a:solidFill>
+                </a:uFill>
+                <a:latin typeface="Calibri"/>
+              </a:rPr>
+              <a:t>Mapping with drone(stability </a:t>
+            </a:r>
+            <a:r>
+              <a:rPr lang="en-US" sz="3200" b="0" strike="noStrike" spc="-1" dirty="0" err="1" smtClean="0">
+                <a:solidFill>
+                  <a:srgbClr val="000000"/>
+                </a:solidFill>
+                <a:uFill>
+                  <a:solidFill>
+                    <a:srgbClr val="FFFFFF"/>
+                  </a:solidFill>
+                </a:uFill>
+                <a:latin typeface="Calibri"/>
+              </a:rPr>
+              <a:t>etc</a:t>
+            </a:r>
+            <a:r>
+              <a:rPr lang="en-US" sz="3200" b="0" strike="noStrike" spc="-1" dirty="0" smtClean="0">
+                <a:solidFill>
+                  <a:srgbClr val="000000"/>
+                </a:solidFill>
+                <a:uFill>
+                  <a:solidFill>
+                    <a:srgbClr val="FFFFFF"/>
+                  </a:solidFill>
+                </a:uFill>
+                <a:latin typeface="Calibri"/>
+              </a:rPr>
+              <a:t>)</a:t>
+            </a:r>
+          </a:p>
+          <a:p>
+            <a:pPr marL="108000">
+              <a:buClr>
+                <a:srgbClr val="000000"/>
+              </a:buClr>
+              <a:buSzPct val="45000"/>
+            </a:pPr>
+            <a:r>
+              <a:rPr lang="en-US" sz="3200" spc="-1" dirty="0" smtClean="0">
+                <a:solidFill>
+                  <a:srgbClr val="000000"/>
+                </a:solidFill>
+                <a:uFill>
+                  <a:solidFill>
+                    <a:srgbClr val="FFFFFF"/>
+                  </a:solidFill>
+                </a:uFill>
+                <a:latin typeface="Calibri"/>
+              </a:rPr>
+              <a:t>Financing the project and conflicts with DOD over possession of lethal technology</a:t>
+            </a:r>
+            <a:endParaRPr lang="en-US" sz="3200" b="0" strike="noStrike" spc="-1" dirty="0">
+              <a:solidFill>
+                <a:srgbClr val="000000"/>
+              </a:solidFill>
+              <a:uFill>
+                <a:solidFill>
+                  <a:srgbClr val="FFFFFF"/>
+                </a:solidFill>
+              </a:uFill>
+              <a:latin typeface="Calibri"/>
+            </a:endParaRPr>
+          </a:p>
+        </p:txBody>
+      </p:sp>
+    </p:spTree>
+    <p:extLst>
+      <p:ext uri="{BB962C8B-B14F-4D97-AF65-F5344CB8AC3E}">
+        <p14:creationId xmlns:p14="http://schemas.microsoft.com/office/powerpoint/2010/main" val="4073238516"/>
+      </p:ext>
+    </p:extLst>
+  </p:cSld>
+  <p:clrMapOvr>
+    <a:masterClrMapping/>
+  </p:clrMapOvr>
+  <p:timing>
+    <p:tnLst>
+      <p:par>
+        <p:cTn id="1" dur="indefinite" restart="never" nodeType="tmRoot">
+          <p:childTnLst>
+            <p:seq>
+              <p:cTn id="2" nodeType="mainSeq"/>
+              <p:prevCondLst>
+                <p:cond evt="onPrev" delay="0">
+                  <p:tgtEl>
+                    <p:sldTgt/>
+                  </p:tgtEl>
+                </p:cond>
+              </p:prevCondLst>
+              <p:nextCondLst>
+                <p:cond evt="onNext" delay="0">
+                  <p:tgtEl>
+                    <p:sldTgt/>
+                  </p:tgtEl>
+                </p:cond>
+              </p:nextCondLst>
+            </p:seq>
+          </p:childTnLst>
+        </p:cTn>
+      </p:par>
+    </p:tnLst>
+  </p:timing>
+</p:sld>
+</file>
+
+<file path=ppt/slides/slide15.xml><?xml version="1.0" encoding="utf-8"?>
+<p:sld xmlns:a="http://schemas.openxmlformats.org/drawingml/2006/main" xmlns:r="http://schemas.openxmlformats.org/officeDocument/2006/relationships" xmlns:p="http://schemas.openxmlformats.org/presentationml/2006/main">
+  <p:cSld>
+    <p:spTree>
+      <p:nvGrpSpPr>
+        <p:cNvPr id="1" name=""/>
+        <p:cNvGrpSpPr/>
+        <p:nvPr/>
+      </p:nvGrpSpPr>
+      <p:grpSpPr>
+        <a:xfrm>
+          <a:off x="0" y="0"/>
+          <a:ext cx="0" cy="0"/>
+          <a:chOff x="0" y="0"/>
+          <a:chExt cx="0" cy="0"/>
+        </a:xfrm>
+      </p:grpSpPr>
+      <p:sp>
+        <p:nvSpPr>
+          <p:cNvPr id="140" name="TextShape 1"/>
+          <p:cNvSpPr txBox="1"/>
+          <p:nvPr/>
+        </p:nvSpPr>
+        <p:spPr>
+          <a:xfrm>
+            <a:off x="457200" y="274680"/>
+            <a:ext cx="8229240" cy="1142640"/>
+          </a:xfrm>
+          <a:prstGeom prst="rect">
+            <a:avLst/>
+          </a:prstGeom>
+          <a:noFill/>
+          <a:ln>
+            <a:noFill/>
+          </a:ln>
+        </p:spPr>
+        <p:txBody>
+          <a:bodyPr anchor="ctr"/>
+          <a:lstStyle/>
+          <a:p>
+            <a:pPr algn="ctr">
+              <a:lnSpc>
+                <a:spcPct val="100000"/>
+              </a:lnSpc>
+            </a:pPr>
+            <a:r>
+              <a:rPr lang="en-US" sz="4400" b="0" strike="noStrike" spc="-1" dirty="0" smtClean="0">
+                <a:solidFill>
+                  <a:srgbClr val="000000"/>
+                </a:solidFill>
+                <a:uFill>
+                  <a:solidFill>
+                    <a:srgbClr val="FFFFFF"/>
+                  </a:solidFill>
+                </a:uFill>
+                <a:latin typeface="Calibri"/>
+              </a:rPr>
+              <a:t>Next steps</a:t>
+            </a:r>
+            <a:endParaRPr lang="en-US" sz="4400" b="0" strike="noStrike" spc="-1" dirty="0">
+              <a:solidFill>
+                <a:srgbClr val="000000"/>
+              </a:solidFill>
+              <a:uFill>
+                <a:solidFill>
+                  <a:srgbClr val="FFFFFF"/>
+                </a:solidFill>
+              </a:uFill>
+              <a:latin typeface="Calibri"/>
+            </a:endParaRPr>
+          </a:p>
+        </p:txBody>
+      </p:sp>
+      <p:sp>
+        <p:nvSpPr>
+          <p:cNvPr id="141" name="TextShape 2"/>
+          <p:cNvSpPr txBox="1"/>
+          <p:nvPr/>
+        </p:nvSpPr>
+        <p:spPr>
+          <a:xfrm>
+            <a:off x="457200" y="1496449"/>
+            <a:ext cx="8229240" cy="3400865"/>
+          </a:xfrm>
+          <a:prstGeom prst="rect">
+            <a:avLst/>
+          </a:prstGeom>
+          <a:noFill/>
+          <a:ln>
+            <a:noFill/>
+          </a:ln>
+        </p:spPr>
+        <p:txBody>
+          <a:bodyPr/>
+          <a:lstStyle/>
+          <a:p>
+            <a:pPr marL="108000">
+              <a:buClr>
+                <a:srgbClr val="000000"/>
+              </a:buClr>
+              <a:buSzPct val="45000"/>
+            </a:pPr>
+            <a:r>
+              <a:rPr lang="en-US" sz="3200" spc="-1" dirty="0" smtClean="0">
+                <a:solidFill>
+                  <a:srgbClr val="000000"/>
+                </a:solidFill>
+                <a:uFill>
+                  <a:solidFill>
+                    <a:srgbClr val="FFFFFF"/>
+                  </a:solidFill>
+                </a:uFill>
+                <a:latin typeface="Calibri"/>
+              </a:rPr>
+              <a:t>Wireless mapping</a:t>
+            </a:r>
+          </a:p>
+          <a:p>
+            <a:pPr marL="108000">
+              <a:buClr>
+                <a:srgbClr val="000000"/>
+              </a:buClr>
+              <a:buSzPct val="45000"/>
+            </a:pPr>
+            <a:r>
+              <a:rPr lang="en-US" sz="3200" b="0" strike="noStrike" spc="-1" dirty="0" smtClean="0">
+                <a:solidFill>
+                  <a:srgbClr val="000000"/>
+                </a:solidFill>
+                <a:uFill>
+                  <a:solidFill>
+                    <a:srgbClr val="FFFFFF"/>
+                  </a:solidFill>
+                </a:uFill>
+                <a:latin typeface="Calibri"/>
+              </a:rPr>
+              <a:t>Mapping using SBC</a:t>
+            </a:r>
+          </a:p>
+          <a:p>
+            <a:pPr marL="108000">
+              <a:buClr>
+                <a:srgbClr val="000000"/>
+              </a:buClr>
+              <a:buSzPct val="45000"/>
+            </a:pPr>
+            <a:r>
+              <a:rPr lang="en-US" sz="3200" spc="-1" dirty="0">
+                <a:solidFill>
+                  <a:srgbClr val="000000"/>
+                </a:solidFill>
+                <a:uFill>
+                  <a:solidFill>
+                    <a:srgbClr val="FFFFFF"/>
+                  </a:solidFill>
+                </a:uFill>
+                <a:latin typeface="Calibri"/>
+              </a:rPr>
+              <a:t>Build drone</a:t>
+            </a:r>
+          </a:p>
+          <a:p>
+            <a:pPr marL="108000">
+              <a:buClr>
+                <a:srgbClr val="000000"/>
+              </a:buClr>
+              <a:buSzPct val="45000"/>
+            </a:pPr>
+            <a:endParaRPr lang="en-US" sz="3200" b="0" strike="noStrike" spc="-1" dirty="0" smtClean="0">
+              <a:solidFill>
+                <a:srgbClr val="000000"/>
+              </a:solidFill>
+              <a:uFill>
+                <a:solidFill>
+                  <a:srgbClr val="FFFFFF"/>
+                </a:solidFill>
+              </a:uFill>
+              <a:latin typeface="Calibri"/>
+            </a:endParaRPr>
+          </a:p>
+        </p:txBody>
+      </p:sp>
+    </p:spTree>
+    <p:extLst>
+      <p:ext uri="{BB962C8B-B14F-4D97-AF65-F5344CB8AC3E}">
+        <p14:creationId xmlns:p14="http://schemas.microsoft.com/office/powerpoint/2010/main" val="2023233232"/>
+      </p:ext>
+    </p:extLst>
+  </p:cSld>
+  <p:clrMapOvr>
+    <a:masterClrMapping/>
+  </p:clrMapOvr>
+  <p:timing>
+    <p:tnLst>
+      <p:par>
+        <p:cTn id="1" dur="indefinite" restart="never" nodeType="tmRoot">
+          <p:childTnLst>
+            <p:seq>
+              <p:cTn id="2" nodeType="mainSeq"/>
+              <p:prevCondLst>
+                <p:cond evt="onPrev" delay="0">
+                  <p:tgtEl>
+                    <p:sldTgt/>
+                  </p:tgtEl>
+                </p:cond>
+              </p:prevCondLst>
+              <p:nextCondLst>
+                <p:cond evt="onNext" delay="0">
+                  <p:tgtEl>
+                    <p:sldTgt/>
+                  </p:tgtEl>
+                </p:cond>
+              </p:nextCondLst>
+            </p:seq>
+          </p:childTnLst>
+        </p:cTn>
+      </p:par>
+    </p:tnLst>
+  </p:timing>
+</p:sld>
+</file>
+
+<file path=ppt/slides/slide16.xml><?xml version="1.0" encoding="utf-8"?>
+<p:sld xmlns:a="http://schemas.openxmlformats.org/drawingml/2006/main" xmlns:r="http://schemas.openxmlformats.org/officeDocument/2006/relationships" xmlns:p="http://schemas.openxmlformats.org/presentationml/2006/main">
+  <p:cSld>
+    <p:spTree>
+      <p:nvGrpSpPr>
+        <p:cNvPr id="1" name=""/>
+        <p:cNvGrpSpPr/>
+        <p:nvPr/>
+      </p:nvGrpSpPr>
+      <p:grpSpPr>
+        <a:xfrm>
+          <a:off x="0" y="0"/>
+          <a:ext cx="0" cy="0"/>
+          <a:chOff x="0" y="0"/>
+          <a:chExt cx="0" cy="0"/>
+        </a:xfrm>
+      </p:grpSpPr>
+      <p:sp>
+        <p:nvSpPr>
+          <p:cNvPr id="140" name="TextShape 1"/>
+          <p:cNvSpPr txBox="1"/>
+          <p:nvPr/>
+        </p:nvSpPr>
+        <p:spPr>
+          <a:xfrm>
+            <a:off x="457200" y="274680"/>
+            <a:ext cx="8229240" cy="1142640"/>
+          </a:xfrm>
+          <a:prstGeom prst="rect">
+            <a:avLst/>
+          </a:prstGeom>
+          <a:noFill/>
+          <a:ln>
+            <a:noFill/>
+          </a:ln>
+        </p:spPr>
+        <p:txBody>
+          <a:bodyPr anchor="ctr"/>
+          <a:lstStyle/>
+          <a:p>
+            <a:pPr algn="ctr">
+              <a:lnSpc>
+                <a:spcPct val="100000"/>
+              </a:lnSpc>
+            </a:pPr>
+            <a:r>
+              <a:rPr lang="en-US" sz="4400" b="0" strike="noStrike" spc="-1" dirty="0" smtClean="0">
+                <a:solidFill>
+                  <a:srgbClr val="000000"/>
+                </a:solidFill>
+                <a:uFill>
+                  <a:solidFill>
+                    <a:srgbClr val="FFFFFF"/>
+                  </a:solidFill>
+                </a:uFill>
+                <a:latin typeface="Calibri"/>
+              </a:rPr>
+              <a:t>Future work</a:t>
+            </a:r>
+            <a:endParaRPr lang="en-US" sz="4400" b="0" strike="noStrike" spc="-1" dirty="0">
+              <a:solidFill>
+                <a:srgbClr val="000000"/>
+              </a:solidFill>
+              <a:uFill>
+                <a:solidFill>
+                  <a:srgbClr val="FFFFFF"/>
+                </a:solidFill>
+              </a:uFill>
+              <a:latin typeface="Calibri"/>
+            </a:endParaRPr>
+          </a:p>
+        </p:txBody>
+      </p:sp>
+      <p:sp>
+        <p:nvSpPr>
+          <p:cNvPr id="141" name="TextShape 2"/>
+          <p:cNvSpPr txBox="1"/>
+          <p:nvPr/>
+        </p:nvSpPr>
+        <p:spPr>
+          <a:xfrm>
+            <a:off x="457200" y="1496449"/>
+            <a:ext cx="8229240" cy="3400865"/>
+          </a:xfrm>
+          <a:prstGeom prst="rect">
+            <a:avLst/>
+          </a:prstGeom>
+          <a:noFill/>
+          <a:ln>
+            <a:noFill/>
+          </a:ln>
+        </p:spPr>
+        <p:txBody>
+          <a:bodyPr/>
+          <a:lstStyle/>
+          <a:p>
+            <a:pPr marL="108000">
+              <a:buClr>
+                <a:srgbClr val="000000"/>
+              </a:buClr>
+              <a:buSzPct val="45000"/>
+            </a:pPr>
+            <a:r>
+              <a:rPr lang="en-US" sz="3200" spc="-1" dirty="0" smtClean="0">
+                <a:solidFill>
+                  <a:srgbClr val="000000"/>
+                </a:solidFill>
+                <a:uFill>
+                  <a:solidFill>
+                    <a:srgbClr val="FFFFFF"/>
+                  </a:solidFill>
+                </a:uFill>
+                <a:latin typeface="Calibri"/>
+              </a:rPr>
+              <a:t>ML</a:t>
+            </a:r>
+          </a:p>
+          <a:p>
+            <a:pPr marL="108000">
+              <a:buClr>
+                <a:srgbClr val="000000"/>
+              </a:buClr>
+              <a:buSzPct val="45000"/>
+            </a:pPr>
+            <a:r>
+              <a:rPr lang="en-US" sz="3200" spc="-1" dirty="0" smtClean="0">
+                <a:solidFill>
+                  <a:srgbClr val="000000"/>
+                </a:solidFill>
+                <a:uFill>
+                  <a:solidFill>
+                    <a:srgbClr val="FFFFFF"/>
+                  </a:solidFill>
+                </a:uFill>
+                <a:latin typeface="Calibri"/>
+              </a:rPr>
+              <a:t>Object recognition</a:t>
+            </a:r>
+          </a:p>
+          <a:p>
+            <a:pPr marL="108000">
+              <a:buClr>
+                <a:srgbClr val="000000"/>
+              </a:buClr>
+              <a:buSzPct val="45000"/>
+            </a:pPr>
+            <a:r>
+              <a:rPr lang="en-US" sz="3200" spc="-1" dirty="0" smtClean="0">
+                <a:solidFill>
+                  <a:srgbClr val="000000"/>
+                </a:solidFill>
+                <a:uFill>
+                  <a:solidFill>
+                    <a:srgbClr val="FFFFFF"/>
+                  </a:solidFill>
+                </a:uFill>
+                <a:latin typeface="Calibri"/>
+              </a:rPr>
+              <a:t>Autonomous control</a:t>
+            </a:r>
+          </a:p>
+          <a:p>
+            <a:pPr marL="108000">
+              <a:buClr>
+                <a:srgbClr val="000000"/>
+              </a:buClr>
+              <a:buSzPct val="45000"/>
+            </a:pPr>
+            <a:r>
+              <a:rPr lang="en-US" sz="3200" spc="-1" dirty="0" smtClean="0">
+                <a:solidFill>
+                  <a:srgbClr val="000000"/>
+                </a:solidFill>
+                <a:uFill>
+                  <a:solidFill>
+                    <a:srgbClr val="FFFFFF"/>
+                  </a:solidFill>
+                </a:uFill>
+                <a:latin typeface="Calibri"/>
+              </a:rPr>
+              <a:t>AI to rule the world</a:t>
+            </a:r>
+          </a:p>
+          <a:p>
+            <a:pPr marL="108000">
+              <a:buClr>
+                <a:srgbClr val="000000"/>
+              </a:buClr>
+              <a:buSzPct val="45000"/>
+            </a:pPr>
+            <a:endParaRPr lang="en-US" sz="3200" spc="-1" dirty="0">
+              <a:solidFill>
+                <a:srgbClr val="000000"/>
+              </a:solidFill>
+              <a:uFill>
+                <a:solidFill>
+                  <a:srgbClr val="FFFFFF"/>
+                </a:solidFill>
+              </a:uFill>
+              <a:latin typeface="Calibri"/>
+            </a:endParaRPr>
+          </a:p>
+          <a:p>
+            <a:pPr marL="108000">
+              <a:buClr>
+                <a:srgbClr val="000000"/>
+              </a:buClr>
+              <a:buSzPct val="45000"/>
+            </a:pPr>
+            <a:endParaRPr lang="en-US" sz="3200" b="0" strike="noStrike" spc="-1" dirty="0" smtClean="0">
+              <a:solidFill>
+                <a:srgbClr val="000000"/>
+              </a:solidFill>
+              <a:uFill>
+                <a:solidFill>
+                  <a:srgbClr val="FFFFFF"/>
+                </a:solidFill>
+              </a:uFill>
+              <a:latin typeface="Calibri"/>
+            </a:endParaRPr>
+          </a:p>
+        </p:txBody>
+      </p:sp>
+    </p:spTree>
+    <p:extLst>
+      <p:ext uri="{BB962C8B-B14F-4D97-AF65-F5344CB8AC3E}">
+        <p14:creationId xmlns:p14="http://schemas.microsoft.com/office/powerpoint/2010/main" val="3833418578"/>
+      </p:ext>
+    </p:extLst>
+  </p:cSld>
+  <p:clrMapOvr>
+    <a:masterClrMapping/>
+  </p:clrMapOvr>
+  <p:timing>
+    <p:tnLst>
+      <p:par>
+        <p:cTn id="1" dur="indefinite" restart="never" nodeType="tmRoot">
+          <p:childTnLst>
+            <p:seq>
+              <p:cTn id="2" nodeType="mainSeq"/>
+              <p:prevCondLst>
+                <p:cond evt="onPrev" delay="0">
+                  <p:tgtEl>
+                    <p:sldTgt/>
+                  </p:tgtEl>
+                </p:cond>
+              </p:prevCondLst>
+              <p:nextCondLst>
+                <p:cond evt="onNext" delay="0">
+                  <p:tgtEl>
+                    <p:sldTgt/>
+                  </p:tgtEl>
+                </p:cond>
+              </p:nextCondLst>
+            </p:seq>
+          </p:childTnLst>
+        </p:cTn>
+      </p:par>
+    </p:tnLst>
+  </p:timing>
+</p:sld>
+</file>
+
+<file path=ppt/slides/slide17.xml><?xml version="1.0" encoding="utf-8"?>
 <p:sld xmlns:a="http://schemas.openxmlformats.org/drawingml/2006/main" xmlns:r="http://schemas.openxmlformats.org/officeDocument/2006/relationships" xmlns:p="http://schemas.openxmlformats.org/presentationml/2006/main">
   <p:cSld>
     <p:spTree>
@@ -9016,7 +10535,7 @@
 </p:sld>
 </file>
 
-<file path=ppt/slides/slide11.xml><?xml version="1.0" encoding="utf-8"?>
+<file path=ppt/slides/slide18.xml><?xml version="1.0" encoding="utf-8"?>
 <p:sld xmlns:a="http://schemas.openxmlformats.org/drawingml/2006/main" xmlns:r="http://schemas.openxmlformats.org/officeDocument/2006/relationships" xmlns:p="http://schemas.openxmlformats.org/presentationml/2006/main">
   <p:cSld>
     <p:spTree>
@@ -9291,7 +10810,7 @@
 </p:sld>
 </file>
 
-<file path=ppt/slides/slide12.xml><?xml version="1.0" encoding="utf-8"?>
+<file path=ppt/slides/slide19.xml><?xml version="1.0" encoding="utf-8"?>
 <p:sld xmlns:a="http://schemas.openxmlformats.org/drawingml/2006/main" xmlns:r="http://schemas.openxmlformats.org/officeDocument/2006/relationships" xmlns:p="http://schemas.openxmlformats.org/presentationml/2006/main">
   <p:cSld>
     <p:spTree>
@@ -12244,6 +13763,20 @@
               <a:buChar char=""/>
             </a:pPr>
             <a:r>
+              <a:rPr lang="en-US" sz="2400" spc="-1" dirty="0" smtClean="0">
+                <a:solidFill>
+                  <a:srgbClr val="000000"/>
+                </a:solidFill>
+                <a:uFill>
+                  <a:solidFill>
+                    <a:srgbClr val="FFFFFF"/>
+                  </a:solidFill>
+                </a:uFill>
+                <a:latin typeface="Calibri"/>
+              </a:rPr>
+              <a:t>P</a:t>
+            </a:r>
+            <a:r>
               <a:rPr lang="en-US" sz="2400" b="0" strike="noStrike" spc="-1" dirty="0" smtClean="0">
                 <a:solidFill>
                   <a:srgbClr val="000000"/>
@@ -12255,7 +13788,21 @@
                 </a:uFill>
                 <a:latin typeface="Calibri"/>
               </a:rPr>
-              <a:t> </a:t>
+              <a:t>racticing </a:t>
+            </a:r>
+            <a:r>
+              <a:rPr lang="en-US" sz="2400" b="0" strike="noStrike" spc="-1" dirty="0" smtClean="0">
+                <a:solidFill>
+                  <a:srgbClr val="000000"/>
+                </a:solidFill>
+                <a:uFill>
+                  <a:solidFill>
+                    <a:srgbClr val="FFFFFF"/>
+                  </a:solidFill>
+                </a:uFill>
+                <a:latin typeface="Calibri"/>
+              </a:rPr>
+              <a:t>ROS </a:t>
             </a:r>
             <a:r>
               <a:rPr lang="en-US" sz="2400" spc="-1" dirty="0" smtClean="0">
@@ -12269,8 +13816,32 @@
                 </a:uFill>
                 <a:latin typeface="Calibri"/>
               </a:rPr>
-              <a:t>P</a:t>
-            </a:r>
+              <a:t>commands by following the official ROS </a:t>
+            </a:r>
+            <a:r>
+              <a:rPr lang="en-US" sz="2400" spc="-1" dirty="0" smtClean="0">
+                <a:solidFill>
+                  <a:srgbClr val="000000"/>
+                </a:solidFill>
+                <a:uFill>
+                  <a:solidFill>
+                    <a:srgbClr val="FFFFFF"/>
+                  </a:solidFill>
+                </a:uFill>
+                <a:latin typeface="Calibri"/>
+              </a:rPr>
+              <a:t>wiki</a:t>
+            </a:r>
+          </a:p>
+          <a:p>
+            <a:pPr marL="432000" indent="-324000">
+              <a:buClr>
+                <a:srgbClr val="000000"/>
+              </a:buClr>
+              <a:buSzPct val="45000"/>
+              <a:buFont typeface="Wingdings" charset="2"/>
+              <a:buChar char=""/>
+            </a:pPr>
             <a:r>
               <a:rPr lang="en-US" sz="2400" b="0" strike="noStrike" spc="-1" dirty="0" smtClean="0">
                 <a:solidFill>
@@ -12283,22 +13854,18 @@
                 </a:uFill>
                 <a:latin typeface="Calibri"/>
               </a:rPr>
-              <a:t>racticing ROS </a:t>
-            </a:r>
-            <a:r>
-              <a:rPr lang="en-US" sz="2400" spc="-1" dirty="0" smtClean="0">
-                <a:solidFill>
-                  <a:srgbClr val="000000"/>
-                </a:solidFill>
-                <a:uFill>
-                  <a:solidFill>
-                    <a:srgbClr val="FFFFFF"/>
-                  </a:solidFill>
-                </a:uFill>
-                <a:latin typeface="Calibri"/>
-              </a:rPr>
-              <a:t>commands by following the official ROS wiki</a:t>
-            </a:r>
+              <a:t>RTAB installation</a:t>
+            </a:r>
+          </a:p>
+          <a:p>
+            <a:pPr marL="432000" indent="-324000">
+              <a:buClr>
+                <a:srgbClr val="000000"/>
+              </a:buClr>
+              <a:buSzPct val="45000"/>
+              <a:buFont typeface="Wingdings" charset="2"/>
+              <a:buChar char=""/>
+            </a:pPr>
             <a:endParaRPr lang="en-US" sz="3200" b="0" strike="noStrike" spc="-1" dirty="0">
               <a:solidFill>
                 <a:srgbClr val="000000"/>

</xml_diff>